<commit_message>
Fazit slide in Abschlusspräsentation updated
</commit_message>
<xml_diff>
--- a/documentation/Abschluss/Abschlusspräsentation.pptx
+++ b/documentation/Abschluss/Abschlusspräsentation.pptx
@@ -128,7 +128,7 @@
   </p:defaultTextStyle>
   <p:extLst>
     <p:ext uri="{EFAFB233-063F-42B5-8137-9DF3F51BA10A}">
-      <p15:sldGuideLst xmlns:p15="http://schemas.microsoft.com/office/powerpoint/2012/main">
+      <p15:sldGuideLst xmlns:p15="http://schemas.microsoft.com/office/powerpoint/2012/main" xmlns="">
         <p15:guide id="1" orient="horz" pos="2160">
           <p15:clr>
             <a:srgbClr val="A4A3A4"/>
@@ -146,18 +146,8 @@
 </file>
 
 <file path=ppt/charts/chart1.xml><?xml version="1.0" encoding="utf-8"?>
-<c:chartSpace xmlns:c="http://schemas.openxmlformats.org/drawingml/2006/chart" xmlns:a="http://schemas.openxmlformats.org/drawingml/2006/main" xmlns:r="http://schemas.openxmlformats.org/officeDocument/2006/relationships" xmlns:c16r2="http://schemas.microsoft.com/office/drawing/2015/06/chart">
-  <c:date1904 val="0"/>
+<c:chartSpace xmlns:c="http://schemas.openxmlformats.org/drawingml/2006/chart" xmlns:a="http://schemas.openxmlformats.org/drawingml/2006/main" xmlns:r="http://schemas.openxmlformats.org/officeDocument/2006/relationships">
   <c:lang val="de-DE"/>
-  <c:roundedCorners val="0"/>
-  <mc:AlternateContent xmlns:mc="http://schemas.openxmlformats.org/markup-compatibility/2006">
-    <mc:Choice xmlns:c14="http://schemas.microsoft.com/office/drawing/2007/8/2/chart" Requires="c14">
-      <c14:style val="102"/>
-    </mc:Choice>
-    <mc:Fallback>
-      <c:style val="2"/>
-    </mc:Fallback>
-  </mc:AlternateContent>
   <c:chart>
     <c:title>
       <c:tx>
@@ -185,7 +175,7 @@
           </a:p>
         </c:rich>
       </c:tx>
-      <c:overlay val="0"/>
+      <c:layout/>
       <c:spPr>
         <a:noFill/>
         <a:ln>
@@ -194,13 +184,11 @@
         <a:effectLst/>
       </c:spPr>
     </c:title>
-    <c:autoTitleDeleted val="0"/>
     <c:plotArea>
       <c:layout/>
       <c:barChart>
         <c:barDir val="bar"/>
         <c:grouping val="clustered"/>
-        <c:varyColors val="0"/>
         <c:ser>
           <c:idx val="0"/>
           <c:order val="0"/>
@@ -224,7 +212,6 @@
             </a:ln>
             <a:effectLst/>
           </c:spPr>
-          <c:invertIfNegative val="0"/>
           <c:cat>
             <c:strRef>
               <c:f>Tabelle1!$A$2:$A$7</c:f>
@@ -278,34 +265,25 @@
               </c:numCache>
             </c:numRef>
           </c:val>
-          <c:extLst>
+          <c:extLst xmlns:c16r2="http://schemas.microsoft.com/office/drawing/2015/06/chart">
             <c:ext xmlns:c16="http://schemas.microsoft.com/office/drawing/2014/chart" uri="{C3380CC4-5D6E-409C-BE32-E72D297353CC}">
               <c16:uniqueId val="{00000000-5253-460E-879C-581206D8B81C}"/>
             </c:ext>
           </c:extLst>
         </c:ser>
-        <c:dLbls>
-          <c:showLegendKey val="0"/>
-          <c:showVal val="0"/>
-          <c:showCatName val="0"/>
-          <c:showSerName val="0"/>
-          <c:showPercent val="0"/>
-          <c:showBubbleSize val="0"/>
-        </c:dLbls>
+        <c:dLbls/>
         <c:gapWidth val="182"/>
-        <c:axId val="167525760"/>
-        <c:axId val="131961984"/>
+        <c:axId val="103747584"/>
+        <c:axId val="105390464"/>
       </c:barChart>
       <c:catAx>
-        <c:axId val="167525760"/>
+        <c:axId val="103747584"/>
         <c:scaling>
           <c:orientation val="minMax"/>
         </c:scaling>
-        <c:delete val="0"/>
         <c:axPos val="l"/>
         <c:numFmt formatCode="General" sourceLinked="1"/>
         <c:majorTickMark val="none"/>
-        <c:minorTickMark val="none"/>
         <c:tickLblPos val="nextTo"/>
         <c:spPr>
           <a:noFill/>
@@ -340,21 +318,19 @@
             <a:endParaRPr lang="de-DE"/>
           </a:p>
         </c:txPr>
-        <c:crossAx val="131961984"/>
+        <c:crossAx val="105390464"/>
         <c:crosses val="autoZero"/>
         <c:auto val="1"/>
         <c:lblAlgn val="ctr"/>
         <c:lblOffset val="100"/>
-        <c:noMultiLvlLbl val="0"/>
       </c:catAx>
       <c:valAx>
-        <c:axId val="131961984"/>
+        <c:axId val="105390464"/>
         <c:scaling>
           <c:orientation val="minMax"/>
           <c:max val="7"/>
           <c:min val="1"/>
         </c:scaling>
-        <c:delete val="0"/>
         <c:axPos val="b"/>
         <c:majorGridlines>
           <c:spPr>
@@ -372,7 +348,6 @@
         </c:majorGridlines>
         <c:numFmt formatCode="General" sourceLinked="1"/>
         <c:majorTickMark val="none"/>
-        <c:minorTickMark val="none"/>
         <c:tickLblPos val="nextTo"/>
         <c:spPr>
           <a:noFill/>
@@ -401,7 +376,7 @@
             <a:endParaRPr lang="de-DE"/>
           </a:p>
         </c:txPr>
-        <c:crossAx val="167525760"/>
+        <c:crossAx val="103747584"/>
         <c:crosses val="autoZero"/>
         <c:crossBetween val="between"/>
       </c:valAx>
@@ -415,14 +390,13 @@
     </c:plotArea>
     <c:plotVisOnly val="1"/>
     <c:dispBlanksAs val="gap"/>
-    <c:extLst>
+    <c:extLst xmlns:c16r2="http://schemas.microsoft.com/office/drawing/2015/06/chart">
       <c:ext xmlns:c16r3="http://schemas.microsoft.com/office/drawing/2017/03/chart" uri="{56B9EC1D-385E-4148-901F-78D8002777C0}">
         <c16r3:dataDisplayOptions16>
           <c16r3:dispNaAsBlank val="1"/>
         </c16r3:dataDisplayOptions16>
       </c:ext>
     </c:extLst>
-    <c:showDLblsOverMax val="0"/>
   </c:chart>
   <c:spPr>
     <a:noFill/>
@@ -441,25 +415,13 @@
       <a:endParaRPr lang="de-DE"/>
     </a:p>
   </c:txPr>
-  <c:externalData r:id="rId1">
-    <c:autoUpdate val="0"/>
-  </c:externalData>
+  <c:externalData r:id="rId1"/>
 </c:chartSpace>
 </file>
 
 <file path=ppt/charts/chart2.xml><?xml version="1.0" encoding="utf-8"?>
-<c:chartSpace xmlns:c="http://schemas.openxmlformats.org/drawingml/2006/chart" xmlns:a="http://schemas.openxmlformats.org/drawingml/2006/main" xmlns:r="http://schemas.openxmlformats.org/officeDocument/2006/relationships" xmlns:c16r2="http://schemas.microsoft.com/office/drawing/2015/06/chart">
-  <c:date1904 val="0"/>
+<c:chartSpace xmlns:c="http://schemas.openxmlformats.org/drawingml/2006/chart" xmlns:a="http://schemas.openxmlformats.org/drawingml/2006/main" xmlns:r="http://schemas.openxmlformats.org/officeDocument/2006/relationships">
   <c:lang val="de-DE"/>
-  <c:roundedCorners val="0"/>
-  <mc:AlternateContent xmlns:mc="http://schemas.openxmlformats.org/markup-compatibility/2006">
-    <mc:Choice xmlns:c14="http://schemas.microsoft.com/office/drawing/2007/8/2/chart" Requires="c14">
-      <c14:style val="102"/>
-    </mc:Choice>
-    <mc:Fallback>
-      <c:style val="2"/>
-    </mc:Fallback>
-  </mc:AlternateContent>
   <c:chart>
     <c:title>
       <c:tx>
@@ -487,7 +449,7 @@
           </a:p>
         </c:rich>
       </c:tx>
-      <c:overlay val="0"/>
+      <c:layout/>
       <c:spPr>
         <a:noFill/>
         <a:ln>
@@ -496,23 +458,21 @@
         <a:effectLst/>
       </c:spPr>
     </c:title>
-    <c:autoTitleDeleted val="0"/>
     <c:plotArea>
       <c:layout>
         <c:manualLayout>
           <c:layoutTarget val="inner"/>
           <c:xMode val="edge"/>
           <c:yMode val="edge"/>
-          <c:x val="0.48375717671586405"/>
+          <c:x val="0.4837571767158641"/>
           <c:y val="0.15384222980895401"/>
           <c:w val="0.45679850011537793"/>
-          <c:h val="0.65705195558005514"/>
+          <c:h val="0.65705195558005525"/>
         </c:manualLayout>
       </c:layout>
       <c:barChart>
         <c:barDir val="bar"/>
         <c:grouping val="clustered"/>
-        <c:varyColors val="0"/>
         <c:ser>
           <c:idx val="0"/>
           <c:order val="0"/>
@@ -536,7 +496,6 @@
             </a:ln>
             <a:effectLst/>
           </c:spPr>
-          <c:invertIfNegative val="0"/>
           <c:cat>
             <c:strRef>
               <c:f>Tabelle1!$A$2:$A$9</c:f>
@@ -585,7 +544,7 @@
                   <c:v>4.8333000000000004</c:v>
                 </c:pt>
                 <c:pt idx="3">
-                  <c:v>4.9166700000000008</c:v>
+                  <c:v>4.9166700000000017</c:v>
                 </c:pt>
                 <c:pt idx="4">
                   <c:v>4.25</c:v>
@@ -602,7 +561,7 @@
               </c:numCache>
             </c:numRef>
           </c:val>
-          <c:extLst>
+          <c:extLst xmlns:c16r2="http://schemas.microsoft.com/office/drawing/2015/06/chart">
             <c:ext xmlns:c16="http://schemas.microsoft.com/office/drawing/2014/chart" uri="{C3380CC4-5D6E-409C-BE32-E72D297353CC}">
               <c16:uniqueId val="{00000000-5253-460E-879C-581206D8B81C}"/>
             </c:ext>
@@ -631,7 +590,6 @@
             </a:ln>
             <a:effectLst/>
           </c:spPr>
-          <c:invertIfNegative val="0"/>
           <c:cat>
             <c:strRef>
               <c:f>Tabelle1!$A$2:$A$9</c:f>
@@ -683,7 +641,7 @@
                   <c:v>5.25</c:v>
                 </c:pt>
                 <c:pt idx="4">
-                  <c:v>2.8332999999999995</c:v>
+                  <c:v>2.833299999999999</c:v>
                 </c:pt>
                 <c:pt idx="5">
                   <c:v>6.0833300000000001</c:v>
@@ -697,7 +655,7 @@
               </c:numCache>
             </c:numRef>
           </c:val>
-          <c:extLst>
+          <c:extLst xmlns:c16r2="http://schemas.microsoft.com/office/drawing/2015/06/chart">
             <c:ext xmlns:c16="http://schemas.microsoft.com/office/drawing/2014/chart" uri="{C3380CC4-5D6E-409C-BE32-E72D297353CC}">
               <c16:uniqueId val="{00000001-5253-460E-879C-581206D8B81C}"/>
             </c:ext>
@@ -726,7 +684,6 @@
             </a:ln>
             <a:effectLst/>
           </c:spPr>
-          <c:invertIfNegative val="0"/>
           <c:cat>
             <c:strRef>
               <c:f>Tabelle1!$A$2:$A$9</c:f>
@@ -768,34 +725,25 @@
               </c:numCache>
             </c:numRef>
           </c:val>
-          <c:extLst>
+          <c:extLst xmlns:c16r2="http://schemas.microsoft.com/office/drawing/2015/06/chart">
             <c:ext xmlns:c16="http://schemas.microsoft.com/office/drawing/2014/chart" uri="{C3380CC4-5D6E-409C-BE32-E72D297353CC}">
               <c16:uniqueId val="{00000000-B8AC-4D32-B8BD-2D16DC70C46C}"/>
             </c:ext>
           </c:extLst>
         </c:ser>
-        <c:dLbls>
-          <c:showLegendKey val="0"/>
-          <c:showVal val="0"/>
-          <c:showCatName val="0"/>
-          <c:showSerName val="0"/>
-          <c:showPercent val="0"/>
-          <c:showBubbleSize val="0"/>
-        </c:dLbls>
+        <c:dLbls/>
         <c:gapWidth val="182"/>
-        <c:axId val="136965120"/>
-        <c:axId val="137184000"/>
+        <c:axId val="167523840"/>
+        <c:axId val="167525760"/>
       </c:barChart>
       <c:catAx>
-        <c:axId val="136965120"/>
+        <c:axId val="167523840"/>
         <c:scaling>
           <c:orientation val="minMax"/>
         </c:scaling>
-        <c:delete val="0"/>
         <c:axPos val="l"/>
         <c:numFmt formatCode="General" sourceLinked="1"/>
         <c:majorTickMark val="none"/>
-        <c:minorTickMark val="none"/>
         <c:tickLblPos val="nextTo"/>
         <c:spPr>
           <a:noFill/>
@@ -830,21 +778,19 @@
             <a:endParaRPr lang="de-DE"/>
           </a:p>
         </c:txPr>
-        <c:crossAx val="137184000"/>
+        <c:crossAx val="167525760"/>
         <c:crosses val="autoZero"/>
         <c:auto val="1"/>
         <c:lblAlgn val="ctr"/>
         <c:lblOffset val="100"/>
-        <c:noMultiLvlLbl val="0"/>
       </c:catAx>
       <c:valAx>
-        <c:axId val="137184000"/>
+        <c:axId val="167525760"/>
         <c:scaling>
           <c:orientation val="minMax"/>
           <c:max val="7"/>
           <c:min val="1"/>
         </c:scaling>
-        <c:delete val="0"/>
         <c:axPos val="b"/>
         <c:majorGridlines>
           <c:spPr>
@@ -862,7 +808,6 @@
         </c:majorGridlines>
         <c:numFmt formatCode="General" sourceLinked="1"/>
         <c:majorTickMark val="none"/>
-        <c:minorTickMark val="none"/>
         <c:tickLblPos val="nextTo"/>
         <c:spPr>
           <a:noFill/>
@@ -891,7 +836,7 @@
             <a:endParaRPr lang="de-DE"/>
           </a:p>
         </c:txPr>
-        <c:crossAx val="136965120"/>
+        <c:crossAx val="167523840"/>
         <c:crosses val="autoZero"/>
         <c:crossBetween val="between"/>
       </c:valAx>
@@ -909,7 +854,7 @@
         <c:idx val="0"/>
         <c:delete val="1"/>
       </c:legendEntry>
-      <c:overlay val="0"/>
+      <c:layout/>
       <c:spPr>
         <a:noFill/>
         <a:ln>
@@ -940,14 +885,13 @@
     </c:legend>
     <c:plotVisOnly val="1"/>
     <c:dispBlanksAs val="gap"/>
-    <c:extLst>
+    <c:extLst xmlns:c16r2="http://schemas.microsoft.com/office/drawing/2015/06/chart">
       <c:ext xmlns:c16r3="http://schemas.microsoft.com/office/drawing/2017/03/chart" uri="{56B9EC1D-385E-4148-901F-78D8002777C0}">
         <c16r3:dataDisplayOptions16>
           <c16r3:dispNaAsBlank val="1"/>
         </c16r3:dataDisplayOptions16>
       </c:ext>
     </c:extLst>
-    <c:showDLblsOverMax val="0"/>
   </c:chart>
   <c:spPr>
     <a:noFill/>
@@ -966,9 +910,7 @@
       <a:endParaRPr lang="de-DE"/>
     </a:p>
   </c:txPr>
-  <c:externalData r:id="rId1">
-    <c:autoUpdate val="0"/>
-  </c:externalData>
+  <c:externalData r:id="rId1"/>
 </c:chartSpace>
 </file>
 
@@ -2080,6 +2022,13 @@
     <dgm:pt modelId="{7E987B23-1FBF-934F-AE84-A1950824BC19}" type="pres">
       <dgm:prSet presAssocID="{92C21019-64F2-0A48-BD7D-7FDFDD8673B8}" presName="acctBkgd" presStyleLbl="alignAcc1" presStyleIdx="0" presStyleCnt="4"/>
       <dgm:spPr/>
+      <dgm:t>
+        <a:bodyPr/>
+        <a:lstStyle/>
+        <a:p>
+          <a:endParaRPr lang="de-DE"/>
+        </a:p>
+      </dgm:t>
     </dgm:pt>
     <dgm:pt modelId="{018B8698-0B3B-D540-A270-4559257B67AF}" type="pres">
       <dgm:prSet presAssocID="{92C21019-64F2-0A48-BD7D-7FDFDD8673B8}" presName="acctTx" presStyleLbl="alignAcc1" presStyleIdx="0" presStyleCnt="4">
@@ -2088,6 +2037,13 @@
         </dgm:presLayoutVars>
       </dgm:prSet>
       <dgm:spPr/>
+      <dgm:t>
+        <a:bodyPr/>
+        <a:lstStyle/>
+        <a:p>
+          <a:endParaRPr lang="de-DE"/>
+        </a:p>
+      </dgm:t>
     </dgm:pt>
     <dgm:pt modelId="{A9F61433-CB8A-8047-8082-C85308266DA6}" type="pres">
       <dgm:prSet presAssocID="{92C21019-64F2-0A48-BD7D-7FDFDD8673B8}" presName="level" presStyleLbl="node1" presStyleIdx="0" presStyleCnt="4">
@@ -2097,6 +2053,13 @@
         </dgm:presLayoutVars>
       </dgm:prSet>
       <dgm:spPr/>
+      <dgm:t>
+        <a:bodyPr/>
+        <a:lstStyle/>
+        <a:p>
+          <a:endParaRPr lang="de-DE"/>
+        </a:p>
+      </dgm:t>
     </dgm:pt>
     <dgm:pt modelId="{4D34D131-0121-2641-AF3E-C4A924B66906}" type="pres">
       <dgm:prSet presAssocID="{92C21019-64F2-0A48-BD7D-7FDFDD8673B8}" presName="levelTx" presStyleLbl="revTx" presStyleIdx="0" presStyleCnt="0">
@@ -2106,6 +2069,13 @@
         </dgm:presLayoutVars>
       </dgm:prSet>
       <dgm:spPr/>
+      <dgm:t>
+        <a:bodyPr/>
+        <a:lstStyle/>
+        <a:p>
+          <a:endParaRPr lang="de-DE"/>
+        </a:p>
+      </dgm:t>
     </dgm:pt>
     <dgm:pt modelId="{5E71FEFC-0AEF-6148-9B9A-CB806F178227}" type="pres">
       <dgm:prSet presAssocID="{51F1C30F-BC6D-964B-805C-7251FA337436}" presName="Name8" presStyleCnt="0"/>
@@ -2114,6 +2084,13 @@
     <dgm:pt modelId="{8D281AA3-EAE3-0045-A5A0-7223F2D67F92}" type="pres">
       <dgm:prSet presAssocID="{51F1C30F-BC6D-964B-805C-7251FA337436}" presName="acctBkgd" presStyleLbl="alignAcc1" presStyleIdx="1" presStyleCnt="4"/>
       <dgm:spPr/>
+      <dgm:t>
+        <a:bodyPr/>
+        <a:lstStyle/>
+        <a:p>
+          <a:endParaRPr lang="de-DE"/>
+        </a:p>
+      </dgm:t>
     </dgm:pt>
     <dgm:pt modelId="{E9BA28E7-8E28-DC4E-8CFA-4CB60151A223}" type="pres">
       <dgm:prSet presAssocID="{51F1C30F-BC6D-964B-805C-7251FA337436}" presName="acctTx" presStyleLbl="alignAcc1" presStyleIdx="1" presStyleCnt="4">
@@ -2122,6 +2099,13 @@
         </dgm:presLayoutVars>
       </dgm:prSet>
       <dgm:spPr/>
+      <dgm:t>
+        <a:bodyPr/>
+        <a:lstStyle/>
+        <a:p>
+          <a:endParaRPr lang="de-DE"/>
+        </a:p>
+      </dgm:t>
     </dgm:pt>
     <dgm:pt modelId="{6B11F3B5-2AD7-F54A-803F-23A8CC73E218}" type="pres">
       <dgm:prSet presAssocID="{51F1C30F-BC6D-964B-805C-7251FA337436}" presName="level" presStyleLbl="node1" presStyleIdx="1" presStyleCnt="4">
@@ -2131,6 +2115,13 @@
         </dgm:presLayoutVars>
       </dgm:prSet>
       <dgm:spPr/>
+      <dgm:t>
+        <a:bodyPr/>
+        <a:lstStyle/>
+        <a:p>
+          <a:endParaRPr lang="de-DE"/>
+        </a:p>
+      </dgm:t>
     </dgm:pt>
     <dgm:pt modelId="{48B723AD-B3BC-6C4A-BEC9-85FE6C47C9A8}" type="pres">
       <dgm:prSet presAssocID="{51F1C30F-BC6D-964B-805C-7251FA337436}" presName="levelTx" presStyleLbl="revTx" presStyleIdx="0" presStyleCnt="0">
@@ -2140,6 +2131,13 @@
         </dgm:presLayoutVars>
       </dgm:prSet>
       <dgm:spPr/>
+      <dgm:t>
+        <a:bodyPr/>
+        <a:lstStyle/>
+        <a:p>
+          <a:endParaRPr lang="de-DE"/>
+        </a:p>
+      </dgm:t>
     </dgm:pt>
     <dgm:pt modelId="{E3A7B8DF-2AB4-EF4B-A31D-63776D53F9A5}" type="pres">
       <dgm:prSet presAssocID="{95522B47-3477-C141-AFAA-3FD0434218F0}" presName="Name8" presStyleCnt="0"/>
@@ -2148,6 +2146,13 @@
     <dgm:pt modelId="{D77927C9-F46D-F245-BE2A-ABD276F67486}" type="pres">
       <dgm:prSet presAssocID="{95522B47-3477-C141-AFAA-3FD0434218F0}" presName="acctBkgd" presStyleLbl="alignAcc1" presStyleIdx="2" presStyleCnt="4"/>
       <dgm:spPr/>
+      <dgm:t>
+        <a:bodyPr/>
+        <a:lstStyle/>
+        <a:p>
+          <a:endParaRPr lang="de-DE"/>
+        </a:p>
+      </dgm:t>
     </dgm:pt>
     <dgm:pt modelId="{7CA8BB3D-EC27-DF4B-B646-4F05EA0EC76E}" type="pres">
       <dgm:prSet presAssocID="{95522B47-3477-C141-AFAA-3FD0434218F0}" presName="acctTx" presStyleLbl="alignAcc1" presStyleIdx="2" presStyleCnt="4">
@@ -2156,6 +2161,13 @@
         </dgm:presLayoutVars>
       </dgm:prSet>
       <dgm:spPr/>
+      <dgm:t>
+        <a:bodyPr/>
+        <a:lstStyle/>
+        <a:p>
+          <a:endParaRPr lang="de-DE"/>
+        </a:p>
+      </dgm:t>
     </dgm:pt>
     <dgm:pt modelId="{A8CB1A31-73B3-534A-A39D-2DE64F9500D0}" type="pres">
       <dgm:prSet presAssocID="{95522B47-3477-C141-AFAA-3FD0434218F0}" presName="level" presStyleLbl="node1" presStyleIdx="2" presStyleCnt="4">
@@ -2165,6 +2177,13 @@
         </dgm:presLayoutVars>
       </dgm:prSet>
       <dgm:spPr/>
+      <dgm:t>
+        <a:bodyPr/>
+        <a:lstStyle/>
+        <a:p>
+          <a:endParaRPr lang="de-DE"/>
+        </a:p>
+      </dgm:t>
     </dgm:pt>
     <dgm:pt modelId="{DF22608E-46D2-D64D-9F3F-99E16C8A152A}" type="pres">
       <dgm:prSet presAssocID="{95522B47-3477-C141-AFAA-3FD0434218F0}" presName="levelTx" presStyleLbl="revTx" presStyleIdx="0" presStyleCnt="0">
@@ -2174,6 +2193,13 @@
         </dgm:presLayoutVars>
       </dgm:prSet>
       <dgm:spPr/>
+      <dgm:t>
+        <a:bodyPr/>
+        <a:lstStyle/>
+        <a:p>
+          <a:endParaRPr lang="de-DE"/>
+        </a:p>
+      </dgm:t>
     </dgm:pt>
     <dgm:pt modelId="{BF33163F-9E3F-CB49-B9A9-63644BFD4A82}" type="pres">
       <dgm:prSet presAssocID="{D26D63A6-FB7D-0240-97D8-6615283E9E74}" presName="Name8" presStyleCnt="0"/>
@@ -2182,6 +2208,13 @@
     <dgm:pt modelId="{999FE6A6-E8B1-BB44-B941-3BC9347AA8FE}" type="pres">
       <dgm:prSet presAssocID="{D26D63A6-FB7D-0240-97D8-6615283E9E74}" presName="acctBkgd" presStyleLbl="alignAcc1" presStyleIdx="3" presStyleCnt="4"/>
       <dgm:spPr/>
+      <dgm:t>
+        <a:bodyPr/>
+        <a:lstStyle/>
+        <a:p>
+          <a:endParaRPr lang="de-DE"/>
+        </a:p>
+      </dgm:t>
     </dgm:pt>
     <dgm:pt modelId="{26251B07-6187-0C4B-902B-8F81E2C76F5A}" type="pres">
       <dgm:prSet presAssocID="{D26D63A6-FB7D-0240-97D8-6615283E9E74}" presName="acctTx" presStyleLbl="alignAcc1" presStyleIdx="3" presStyleCnt="4">
@@ -2190,6 +2223,13 @@
         </dgm:presLayoutVars>
       </dgm:prSet>
       <dgm:spPr/>
+      <dgm:t>
+        <a:bodyPr/>
+        <a:lstStyle/>
+        <a:p>
+          <a:endParaRPr lang="de-DE"/>
+        </a:p>
+      </dgm:t>
     </dgm:pt>
     <dgm:pt modelId="{2A0A634F-9A33-6544-B1F3-6BFFBF7806C4}" type="pres">
       <dgm:prSet presAssocID="{D26D63A6-FB7D-0240-97D8-6615283E9E74}" presName="level" presStyleLbl="node1" presStyleIdx="3" presStyleCnt="4">
@@ -2199,6 +2239,13 @@
         </dgm:presLayoutVars>
       </dgm:prSet>
       <dgm:spPr/>
+      <dgm:t>
+        <a:bodyPr/>
+        <a:lstStyle/>
+        <a:p>
+          <a:endParaRPr lang="de-DE"/>
+        </a:p>
+      </dgm:t>
     </dgm:pt>
     <dgm:pt modelId="{E68B17FE-F1BB-8B4E-B878-6C4CEBB5AB7C}" type="pres">
       <dgm:prSet presAssocID="{D26D63A6-FB7D-0240-97D8-6615283E9E74}" presName="levelTx" presStyleLbl="revTx" presStyleIdx="0" presStyleCnt="0">
@@ -2208,34 +2255,41 @@
         </dgm:presLayoutVars>
       </dgm:prSet>
       <dgm:spPr/>
+      <dgm:t>
+        <a:bodyPr/>
+        <a:lstStyle/>
+        <a:p>
+          <a:endParaRPr lang="de-DE"/>
+        </a:p>
+      </dgm:t>
     </dgm:pt>
   </dgm:ptLst>
   <dgm:cxnLst>
-    <dgm:cxn modelId="{1D8B7A02-969F-CF45-8699-77BD1E7D48F3}" type="presOf" srcId="{E3B96449-42AF-F148-8F67-EB889FB6512C}" destId="{8D281AA3-EAE3-0045-A5A0-7223F2D67F92}" srcOrd="0" destOrd="0" presId="urn:microsoft.com/office/officeart/2005/8/layout/pyramid1"/>
-    <dgm:cxn modelId="{71386A13-7EC1-004B-9EBD-37E3167C6D12}" type="presOf" srcId="{D26D63A6-FB7D-0240-97D8-6615283E9E74}" destId="{2A0A634F-9A33-6544-B1F3-6BFFBF7806C4}" srcOrd="0" destOrd="0" presId="urn:microsoft.com/office/officeart/2005/8/layout/pyramid1"/>
+    <dgm:cxn modelId="{E97A5C97-0681-864D-8A3C-14A82006E75D}" srcId="{51F1C30F-BC6D-964B-805C-7251FA337436}" destId="{E3B96449-42AF-F148-8F67-EB889FB6512C}" srcOrd="0" destOrd="0" parTransId="{B5FCD191-7AD4-B448-88CE-82D53C569F1C}" sibTransId="{13F26C4E-C59A-774E-8760-E5E040AFEC23}"/>
+    <dgm:cxn modelId="{EBFDDAD3-5806-1448-A843-A19FFE20FB5A}" type="presOf" srcId="{92C21019-64F2-0A48-BD7D-7FDFDD8673B8}" destId="{A9F61433-CB8A-8047-8082-C85308266DA6}" srcOrd="0" destOrd="0" presId="urn:microsoft.com/office/officeart/2005/8/layout/pyramid1"/>
+    <dgm:cxn modelId="{DC60B0B8-DA17-4A4F-989C-BA209B87140B}" type="presOf" srcId="{D26D63A6-FB7D-0240-97D8-6615283E9E74}" destId="{E68B17FE-F1BB-8B4E-B878-6C4CEBB5AB7C}" srcOrd="1" destOrd="0" presId="urn:microsoft.com/office/officeart/2005/8/layout/pyramid1"/>
+    <dgm:cxn modelId="{211DC5FE-E8F6-E641-82FB-5EBA978E76D0}" srcId="{52B83748-D356-8E4B-901B-689C881CB76E}" destId="{51F1C30F-BC6D-964B-805C-7251FA337436}" srcOrd="1" destOrd="0" parTransId="{A57266B8-A1C1-1B41-A949-12337937A6C8}" sibTransId="{C79C864C-4DC6-7443-A73D-93284B5B0F3A}"/>
+    <dgm:cxn modelId="{52297CD7-8089-D24E-B92B-08B2B0849FA7}" srcId="{D26D63A6-FB7D-0240-97D8-6615283E9E74}" destId="{54BB39A5-BC0D-3B45-B235-407F12CB716A}" srcOrd="0" destOrd="0" parTransId="{6BE7F2BC-7853-2844-BD56-AB5ED85CCB6B}" sibTransId="{984FBD6F-6A42-B741-BB79-BB20B9D4D83F}"/>
+    <dgm:cxn modelId="{112C46F9-DC31-A24F-A8F9-6809E192320C}" type="presOf" srcId="{E3B96449-42AF-F148-8F67-EB889FB6512C}" destId="{E9BA28E7-8E28-DC4E-8CFA-4CB60151A223}" srcOrd="1" destOrd="0" presId="urn:microsoft.com/office/officeart/2005/8/layout/pyramid1"/>
+    <dgm:cxn modelId="{E6B1AA86-CAC3-3949-AEA8-582395F83494}" srcId="{52B83748-D356-8E4B-901B-689C881CB76E}" destId="{95522B47-3477-C141-AFAA-3FD0434218F0}" srcOrd="2" destOrd="0" parTransId="{DFBFE72D-52F8-F54E-9F32-235413E7185E}" sibTransId="{B3DE6D2F-29BD-8247-9BF7-96EB91225252}"/>
     <dgm:cxn modelId="{627BF814-1DF4-6F44-ACBD-B39B7772361D}" type="presOf" srcId="{51F1C30F-BC6D-964B-805C-7251FA337436}" destId="{6B11F3B5-2AD7-F54A-803F-23A8CC73E218}" srcOrd="0" destOrd="0" presId="urn:microsoft.com/office/officeart/2005/8/layout/pyramid1"/>
+    <dgm:cxn modelId="{9A721D8F-3AAB-9141-84E7-9B39BE271760}" type="presOf" srcId="{D2AA4A43-264F-8648-B9B2-CFED45AB96AB}" destId="{D77927C9-F46D-F245-BE2A-ABD276F67486}" srcOrd="0" destOrd="0" presId="urn:microsoft.com/office/officeart/2005/8/layout/pyramid1"/>
+    <dgm:cxn modelId="{45E5BCC5-B613-8F47-9D41-F55D9A2F034E}" srcId="{52B83748-D356-8E4B-901B-689C881CB76E}" destId="{D26D63A6-FB7D-0240-97D8-6615283E9E74}" srcOrd="3" destOrd="0" parTransId="{5479B260-1F67-9E43-BC62-5CD5ECE50579}" sibTransId="{CD96E1A7-72A0-D945-B269-B382626CF372}"/>
+    <dgm:cxn modelId="{FE5D4574-3829-E849-A575-0E0B3845CA89}" type="presOf" srcId="{95522B47-3477-C141-AFAA-3FD0434218F0}" destId="{DF22608E-46D2-D64D-9F3F-99E16C8A152A}" srcOrd="1" destOrd="0" presId="urn:microsoft.com/office/officeart/2005/8/layout/pyramid1"/>
+    <dgm:cxn modelId="{502CE793-7F02-AA47-9CE6-FDC1E7427C22}" type="presOf" srcId="{86562535-CB87-E34D-8DAD-030AF61C8641}" destId="{7E987B23-1FBF-934F-AE84-A1950824BC19}" srcOrd="0" destOrd="0" presId="urn:microsoft.com/office/officeart/2005/8/layout/pyramid1"/>
     <dgm:cxn modelId="{7B8EC030-0B4B-3F49-93CC-273FA493DEE6}" type="presOf" srcId="{54BB39A5-BC0D-3B45-B235-407F12CB716A}" destId="{26251B07-6187-0C4B-902B-8F81E2C76F5A}" srcOrd="1" destOrd="0" presId="urn:microsoft.com/office/officeart/2005/8/layout/pyramid1"/>
+    <dgm:cxn modelId="{C0DCFC6C-C5B3-A742-AD97-5E92FB86351D}" type="presOf" srcId="{86562535-CB87-E34D-8DAD-030AF61C8641}" destId="{018B8698-0B3B-D540-A270-4559257B67AF}" srcOrd="1" destOrd="0" presId="urn:microsoft.com/office/officeart/2005/8/layout/pyramid1"/>
+    <dgm:cxn modelId="{86DBF4A1-E75F-914F-BDB4-267F893AF406}" type="presOf" srcId="{54BB39A5-BC0D-3B45-B235-407F12CB716A}" destId="{999FE6A6-E8B1-BB44-B941-3BC9347AA8FE}" srcOrd="0" destOrd="0" presId="urn:microsoft.com/office/officeart/2005/8/layout/pyramid1"/>
     <dgm:cxn modelId="{2FE19B32-6313-E84C-8062-479A4E821B8B}" type="presOf" srcId="{51F1C30F-BC6D-964B-805C-7251FA337436}" destId="{48B723AD-B3BC-6C4A-BEC9-85FE6C47C9A8}" srcOrd="1" destOrd="0" presId="urn:microsoft.com/office/officeart/2005/8/layout/pyramid1"/>
     <dgm:cxn modelId="{CD931F3B-724D-E94B-A36F-46CE2D24E813}" srcId="{52B83748-D356-8E4B-901B-689C881CB76E}" destId="{92C21019-64F2-0A48-BD7D-7FDFDD8673B8}" srcOrd="0" destOrd="0" parTransId="{CFFC1156-F014-ED4C-A89E-770AF591ECA4}" sibTransId="{9703F012-5FE8-834E-AD99-07FBC06FD25E}"/>
+    <dgm:cxn modelId="{24C3F674-5E6E-3A42-98C0-BB38B6F005A0}" srcId="{95522B47-3477-C141-AFAA-3FD0434218F0}" destId="{D2AA4A43-264F-8648-B9B2-CFED45AB96AB}" srcOrd="0" destOrd="0" parTransId="{474CA716-F6C1-7B45-8DAC-52B1A20AF057}" sibTransId="{10B6231A-D3E5-9248-B90E-44C8058A4611}"/>
+    <dgm:cxn modelId="{55DB5057-E167-0F4D-9C45-97536FB21FC5}" srcId="{92C21019-64F2-0A48-BD7D-7FDFDD8673B8}" destId="{86562535-CB87-E34D-8DAD-030AF61C8641}" srcOrd="0" destOrd="0" parTransId="{8E834B72-D6E0-FA42-B016-285DE2472A1B}" sibTransId="{955D2653-D915-ED40-80DB-1448DE6D629A}"/>
+    <dgm:cxn modelId="{DBBF9DA3-28E7-7C42-84A2-4562B85A7E17}" type="presOf" srcId="{95522B47-3477-C141-AFAA-3FD0434218F0}" destId="{A8CB1A31-73B3-534A-A39D-2DE64F9500D0}" srcOrd="0" destOrd="0" presId="urn:microsoft.com/office/officeart/2005/8/layout/pyramid1"/>
+    <dgm:cxn modelId="{EA7A61B1-4190-0B40-AE07-15097723928E}" type="presOf" srcId="{D2AA4A43-264F-8648-B9B2-CFED45AB96AB}" destId="{7CA8BB3D-EC27-DF4B-B646-4F05EA0EC76E}" srcOrd="1" destOrd="0" presId="urn:microsoft.com/office/officeart/2005/8/layout/pyramid1"/>
     <dgm:cxn modelId="{8CE25D3E-3852-0647-B35F-AD06DFC609EB}" type="presOf" srcId="{92C21019-64F2-0A48-BD7D-7FDFDD8673B8}" destId="{4D34D131-0121-2641-AF3E-C4A924B66906}" srcOrd="1" destOrd="0" presId="urn:microsoft.com/office/officeart/2005/8/layout/pyramid1"/>
     <dgm:cxn modelId="{389C8662-EA50-E548-927E-2B90779875DA}" type="presOf" srcId="{52B83748-D356-8E4B-901B-689C881CB76E}" destId="{B087545F-E550-464C-8013-DA49045A25FB}" srcOrd="0" destOrd="0" presId="urn:microsoft.com/office/officeart/2005/8/layout/pyramid1"/>
-    <dgm:cxn modelId="{C0DCFC6C-C5B3-A742-AD97-5E92FB86351D}" type="presOf" srcId="{86562535-CB87-E34D-8DAD-030AF61C8641}" destId="{018B8698-0B3B-D540-A270-4559257B67AF}" srcOrd="1" destOrd="0" presId="urn:microsoft.com/office/officeart/2005/8/layout/pyramid1"/>
-    <dgm:cxn modelId="{FE5D4574-3829-E849-A575-0E0B3845CA89}" type="presOf" srcId="{95522B47-3477-C141-AFAA-3FD0434218F0}" destId="{DF22608E-46D2-D64D-9F3F-99E16C8A152A}" srcOrd="1" destOrd="0" presId="urn:microsoft.com/office/officeart/2005/8/layout/pyramid1"/>
-    <dgm:cxn modelId="{24C3F674-5E6E-3A42-98C0-BB38B6F005A0}" srcId="{95522B47-3477-C141-AFAA-3FD0434218F0}" destId="{D2AA4A43-264F-8648-B9B2-CFED45AB96AB}" srcOrd="0" destOrd="0" parTransId="{474CA716-F6C1-7B45-8DAC-52B1A20AF057}" sibTransId="{10B6231A-D3E5-9248-B90E-44C8058A4611}"/>
-    <dgm:cxn modelId="{55DB5057-E167-0F4D-9C45-97536FB21FC5}" srcId="{92C21019-64F2-0A48-BD7D-7FDFDD8673B8}" destId="{86562535-CB87-E34D-8DAD-030AF61C8641}" srcOrd="0" destOrd="0" parTransId="{8E834B72-D6E0-FA42-B016-285DE2472A1B}" sibTransId="{955D2653-D915-ED40-80DB-1448DE6D629A}"/>
-    <dgm:cxn modelId="{E6B1AA86-CAC3-3949-AEA8-582395F83494}" srcId="{52B83748-D356-8E4B-901B-689C881CB76E}" destId="{95522B47-3477-C141-AFAA-3FD0434218F0}" srcOrd="2" destOrd="0" parTransId="{DFBFE72D-52F8-F54E-9F32-235413E7185E}" sibTransId="{B3DE6D2F-29BD-8247-9BF7-96EB91225252}"/>
-    <dgm:cxn modelId="{9A721D8F-3AAB-9141-84E7-9B39BE271760}" type="presOf" srcId="{D2AA4A43-264F-8648-B9B2-CFED45AB96AB}" destId="{D77927C9-F46D-F245-BE2A-ABD276F67486}" srcOrd="0" destOrd="0" presId="urn:microsoft.com/office/officeart/2005/8/layout/pyramid1"/>
-    <dgm:cxn modelId="{502CE793-7F02-AA47-9CE6-FDC1E7427C22}" type="presOf" srcId="{86562535-CB87-E34D-8DAD-030AF61C8641}" destId="{7E987B23-1FBF-934F-AE84-A1950824BC19}" srcOrd="0" destOrd="0" presId="urn:microsoft.com/office/officeart/2005/8/layout/pyramid1"/>
-    <dgm:cxn modelId="{E97A5C97-0681-864D-8A3C-14A82006E75D}" srcId="{51F1C30F-BC6D-964B-805C-7251FA337436}" destId="{E3B96449-42AF-F148-8F67-EB889FB6512C}" srcOrd="0" destOrd="0" parTransId="{B5FCD191-7AD4-B448-88CE-82D53C569F1C}" sibTransId="{13F26C4E-C59A-774E-8760-E5E040AFEC23}"/>
-    <dgm:cxn modelId="{86DBF4A1-E75F-914F-BDB4-267F893AF406}" type="presOf" srcId="{54BB39A5-BC0D-3B45-B235-407F12CB716A}" destId="{999FE6A6-E8B1-BB44-B941-3BC9347AA8FE}" srcOrd="0" destOrd="0" presId="urn:microsoft.com/office/officeart/2005/8/layout/pyramid1"/>
-    <dgm:cxn modelId="{DBBF9DA3-28E7-7C42-84A2-4562B85A7E17}" type="presOf" srcId="{95522B47-3477-C141-AFAA-3FD0434218F0}" destId="{A8CB1A31-73B3-534A-A39D-2DE64F9500D0}" srcOrd="0" destOrd="0" presId="urn:microsoft.com/office/officeart/2005/8/layout/pyramid1"/>
-    <dgm:cxn modelId="{EA7A61B1-4190-0B40-AE07-15097723928E}" type="presOf" srcId="{D2AA4A43-264F-8648-B9B2-CFED45AB96AB}" destId="{7CA8BB3D-EC27-DF4B-B646-4F05EA0EC76E}" srcOrd="1" destOrd="0" presId="urn:microsoft.com/office/officeart/2005/8/layout/pyramid1"/>
-    <dgm:cxn modelId="{DC60B0B8-DA17-4A4F-989C-BA209B87140B}" type="presOf" srcId="{D26D63A6-FB7D-0240-97D8-6615283E9E74}" destId="{E68B17FE-F1BB-8B4E-B878-6C4CEBB5AB7C}" srcOrd="1" destOrd="0" presId="urn:microsoft.com/office/officeart/2005/8/layout/pyramid1"/>
-    <dgm:cxn modelId="{45E5BCC5-B613-8F47-9D41-F55D9A2F034E}" srcId="{52B83748-D356-8E4B-901B-689C881CB76E}" destId="{D26D63A6-FB7D-0240-97D8-6615283E9E74}" srcOrd="3" destOrd="0" parTransId="{5479B260-1F67-9E43-BC62-5CD5ECE50579}" sibTransId="{CD96E1A7-72A0-D945-B269-B382626CF372}"/>
-    <dgm:cxn modelId="{EBFDDAD3-5806-1448-A843-A19FFE20FB5A}" type="presOf" srcId="{92C21019-64F2-0A48-BD7D-7FDFDD8673B8}" destId="{A9F61433-CB8A-8047-8082-C85308266DA6}" srcOrd="0" destOrd="0" presId="urn:microsoft.com/office/officeart/2005/8/layout/pyramid1"/>
-    <dgm:cxn modelId="{52297CD7-8089-D24E-B92B-08B2B0849FA7}" srcId="{D26D63A6-FB7D-0240-97D8-6615283E9E74}" destId="{54BB39A5-BC0D-3B45-B235-407F12CB716A}" srcOrd="0" destOrd="0" parTransId="{6BE7F2BC-7853-2844-BD56-AB5ED85CCB6B}" sibTransId="{984FBD6F-6A42-B741-BB79-BB20B9D4D83F}"/>
-    <dgm:cxn modelId="{112C46F9-DC31-A24F-A8F9-6809E192320C}" type="presOf" srcId="{E3B96449-42AF-F148-8F67-EB889FB6512C}" destId="{E9BA28E7-8E28-DC4E-8CFA-4CB60151A223}" srcOrd="1" destOrd="0" presId="urn:microsoft.com/office/officeart/2005/8/layout/pyramid1"/>
-    <dgm:cxn modelId="{211DC5FE-E8F6-E641-82FB-5EBA978E76D0}" srcId="{52B83748-D356-8E4B-901B-689C881CB76E}" destId="{51F1C30F-BC6D-964B-805C-7251FA337436}" srcOrd="1" destOrd="0" parTransId="{A57266B8-A1C1-1B41-A949-12337937A6C8}" sibTransId="{C79C864C-4DC6-7443-A73D-93284B5B0F3A}"/>
+    <dgm:cxn modelId="{71386A13-7EC1-004B-9EBD-37E3167C6D12}" type="presOf" srcId="{D26D63A6-FB7D-0240-97D8-6615283E9E74}" destId="{2A0A634F-9A33-6544-B1F3-6BFFBF7806C4}" srcOrd="0" destOrd="0" presId="urn:microsoft.com/office/officeart/2005/8/layout/pyramid1"/>
+    <dgm:cxn modelId="{1D8B7A02-969F-CF45-8699-77BD1E7D48F3}" type="presOf" srcId="{E3B96449-42AF-F148-8F67-EB889FB6512C}" destId="{8D281AA3-EAE3-0045-A5A0-7223F2D67F92}" srcOrd="0" destOrd="0" presId="urn:microsoft.com/office/officeart/2005/8/layout/pyramid1"/>
     <dgm:cxn modelId="{1140912D-454D-3140-B36C-3D051227A737}" type="presParOf" srcId="{B087545F-E550-464C-8013-DA49045A25FB}" destId="{1BE0FB69-2C40-A646-8F48-6CA9A4A163F8}" srcOrd="0" destOrd="0" presId="urn:microsoft.com/office/officeart/2005/8/layout/pyramid1"/>
     <dgm:cxn modelId="{123CB294-32AD-A848-BECE-3620CB2030FC}" type="presParOf" srcId="{1BE0FB69-2C40-A646-8F48-6CA9A4A163F8}" destId="{7E987B23-1FBF-934F-AE84-A1950824BC19}" srcOrd="0" destOrd="0" presId="urn:microsoft.com/office/officeart/2005/8/layout/pyramid1"/>
     <dgm:cxn modelId="{8FD2DC62-457F-BC42-85F0-06289DDC0FFD}" type="presParOf" srcId="{1BE0FB69-2C40-A646-8F48-6CA9A4A163F8}" destId="{018B8698-0B3B-D540-A270-4559257B67AF}" srcOrd="1" destOrd="0" presId="urn:microsoft.com/office/officeart/2005/8/layout/pyramid1"/>
@@ -2261,7 +2315,7 @@
   <dgm:whole/>
   <dgm:extLst>
     <a:ext uri="http://schemas.microsoft.com/office/drawing/2008/diagram">
-      <dsp:dataModelExt xmlns:dsp="http://schemas.microsoft.com/office/drawing/2008/diagram" relId="rId6" minVer="http://schemas.openxmlformats.org/drawingml/2006/diagram"/>
+      <dsp:dataModelExt xmlns:dsp="http://schemas.microsoft.com/office/drawing/2008/diagram" xmlns="" relId="rId6" minVer="http://schemas.openxmlformats.org/drawingml/2006/diagram"/>
     </a:ext>
   </dgm:extLst>
 </dgm:dataModel>
@@ -4280,6 +4334,7 @@
           <a:p>
             <a:fld id="{943B4DA7-281E-4EE6-804A-56F379FC019E}" type="datetimeFigureOut">
               <a:rPr lang="de-DE" smtClean="0"/>
+              <a:pPr/>
               <a:t>17.09.2018</a:t>
             </a:fld>
             <a:endParaRPr lang="de-DE"/>
@@ -4438,6 +4493,7 @@
           <a:p>
             <a:fld id="{11E06177-BAEC-4F1A-B0D1-6A04DEDD7055}" type="slidenum">
               <a:rPr lang="de-DE" smtClean="0"/>
+              <a:pPr/>
               <a:t>‹Nr.›</a:t>
             </a:fld>
             <a:endParaRPr lang="de-DE"/>
@@ -4447,7 +4503,7 @@
     </p:spTree>
     <p:extLst>
       <p:ext uri="{BB962C8B-B14F-4D97-AF65-F5344CB8AC3E}">
-        <p14:creationId xmlns:p14="http://schemas.microsoft.com/office/powerpoint/2010/main" val="455812744"/>
+        <p14:creationId xmlns:p14="http://schemas.microsoft.com/office/powerpoint/2010/main" xmlns="" val="455812744"/>
       </p:ext>
     </p:extLst>
   </p:cSld>
@@ -4712,6 +4768,88 @@
               <a:rPr lang="de-DE" smtClean="0"/>
               <a:pPr/>
               <a:t>18</a:t>
+            </a:fld>
+            <a:endParaRPr lang="de-DE"/>
+          </a:p>
+        </p:txBody>
+      </p:sp>
+    </p:spTree>
+  </p:cSld>
+  <p:clrMapOvr>
+    <a:masterClrMapping/>
+  </p:clrMapOvr>
+</p:notes>
+</file>
+
+<file path=ppt/notesSlides/notesSlide2.xml><?xml version="1.0" encoding="utf-8"?>
+<p:notes xmlns:a="http://schemas.openxmlformats.org/drawingml/2006/main" xmlns:r="http://schemas.openxmlformats.org/officeDocument/2006/relationships" xmlns:p="http://schemas.openxmlformats.org/presentationml/2006/main">
+  <p:cSld>
+    <p:spTree>
+      <p:nvGrpSpPr>
+        <p:cNvPr id="1" name=""/>
+        <p:cNvGrpSpPr/>
+        <p:nvPr/>
+      </p:nvGrpSpPr>
+      <p:grpSpPr>
+        <a:xfrm>
+          <a:off x="0" y="0"/>
+          <a:ext cx="0" cy="0"/>
+          <a:chOff x="0" y="0"/>
+          <a:chExt cx="0" cy="0"/>
+        </a:xfrm>
+      </p:grpSpPr>
+      <p:sp>
+        <p:nvSpPr>
+          <p:cNvPr id="2" name="Folienbildplatzhalter 1"/>
+          <p:cNvSpPr>
+            <a:spLocks noGrp="1" noRot="1" noChangeAspect="1"/>
+          </p:cNvSpPr>
+          <p:nvPr>
+            <p:ph type="sldImg"/>
+          </p:nvPr>
+        </p:nvSpPr>
+        <p:spPr/>
+      </p:sp>
+      <p:sp>
+        <p:nvSpPr>
+          <p:cNvPr id="3" name="Notizenplatzhalter 2"/>
+          <p:cNvSpPr>
+            <a:spLocks noGrp="1"/>
+          </p:cNvSpPr>
+          <p:nvPr>
+            <p:ph type="body" idx="1"/>
+          </p:nvPr>
+        </p:nvSpPr>
+        <p:spPr/>
+        <p:txBody>
+          <a:bodyPr>
+            <a:normAutofit/>
+          </a:bodyPr>
+          <a:lstStyle/>
+          <a:p>
+            <a:endParaRPr lang="de-DE" dirty="0"/>
+          </a:p>
+        </p:txBody>
+      </p:sp>
+      <p:sp>
+        <p:nvSpPr>
+          <p:cNvPr id="4" name="Foliennummernplatzhalter 3"/>
+          <p:cNvSpPr>
+            <a:spLocks noGrp="1"/>
+          </p:cNvSpPr>
+          <p:nvPr>
+            <p:ph type="sldNum" sz="quarter" idx="10"/>
+          </p:nvPr>
+        </p:nvSpPr>
+        <p:spPr/>
+        <p:txBody>
+          <a:bodyPr/>
+          <a:lstStyle/>
+          <a:p>
+            <a:fld id="{11E06177-BAEC-4F1A-B0D1-6A04DEDD7055}" type="slidenum">
+              <a:rPr lang="de-DE" smtClean="0"/>
+              <a:pPr/>
+              <a:t>19</a:t>
             </a:fld>
             <a:endParaRPr lang="de-DE"/>
           </a:p>
@@ -9804,6 +9942,13 @@
   <p:clrMapOvr>
     <a:masterClrMapping/>
   </p:clrMapOvr>
+  <p:timing>
+    <p:tnLst>
+      <p:par>
+        <p:cTn id="1" dur="indefinite" restart="never" nodeType="tmRoot"/>
+      </p:par>
+    </p:tnLst>
+  </p:timing>
 </p:sld>
 </file>
 
@@ -10832,13 +10977,20 @@
     </p:spTree>
     <p:extLst>
       <p:ext uri="{BB962C8B-B14F-4D97-AF65-F5344CB8AC3E}">
-        <p14:creationId xmlns:p14="http://schemas.microsoft.com/office/powerpoint/2010/main" val="369021320"/>
+        <p14:creationId xmlns:p14="http://schemas.microsoft.com/office/powerpoint/2010/main" xmlns="" val="369021320"/>
       </p:ext>
     </p:extLst>
   </p:cSld>
   <p:clrMapOvr>
     <a:masterClrMapping/>
   </p:clrMapOvr>
+  <p:timing>
+    <p:tnLst>
+      <p:par>
+        <p:cTn id="1" dur="indefinite" restart="never" nodeType="tmRoot"/>
+      </p:par>
+    </p:tnLst>
+  </p:timing>
 </p:sld>
 </file>
 
@@ -11219,13 +11371,20 @@
     </p:spTree>
     <p:extLst>
       <p:ext uri="{BB962C8B-B14F-4D97-AF65-F5344CB8AC3E}">
-        <p14:creationId xmlns:p14="http://schemas.microsoft.com/office/powerpoint/2010/main" val="1925524024"/>
+        <p14:creationId xmlns:p14="http://schemas.microsoft.com/office/powerpoint/2010/main" xmlns="" val="1925524024"/>
       </p:ext>
     </p:extLst>
   </p:cSld>
   <p:clrMapOvr>
     <a:masterClrMapping/>
   </p:clrMapOvr>
+  <p:timing>
+    <p:tnLst>
+      <p:par>
+        <p:cTn id="1" dur="indefinite" restart="never" nodeType="tmRoot"/>
+      </p:par>
+    </p:tnLst>
+  </p:timing>
 </p:sld>
 </file>
 
@@ -12254,13 +12413,20 @@
     </p:spTree>
     <p:extLst>
       <p:ext uri="{BB962C8B-B14F-4D97-AF65-F5344CB8AC3E}">
-        <p14:creationId xmlns:p14="http://schemas.microsoft.com/office/powerpoint/2010/main" val="215962541"/>
+        <p14:creationId xmlns:p14="http://schemas.microsoft.com/office/powerpoint/2010/main" xmlns="" val="215962541"/>
       </p:ext>
     </p:extLst>
   </p:cSld>
   <p:clrMapOvr>
     <a:masterClrMapping/>
   </p:clrMapOvr>
+  <p:timing>
+    <p:tnLst>
+      <p:par>
+        <p:cTn id="1" dur="indefinite" restart="never" nodeType="tmRoot"/>
+      </p:par>
+    </p:tnLst>
+  </p:timing>
 </p:sld>
 </file>
 
@@ -12401,13 +12567,20 @@
     </p:spTree>
     <p:extLst>
       <p:ext uri="{BB962C8B-B14F-4D97-AF65-F5344CB8AC3E}">
-        <p14:creationId xmlns:p14="http://schemas.microsoft.com/office/powerpoint/2010/main" val="849743291"/>
+        <p14:creationId xmlns:p14="http://schemas.microsoft.com/office/powerpoint/2010/main" xmlns="" val="849743291"/>
       </p:ext>
     </p:extLst>
   </p:cSld>
   <p:clrMapOvr>
     <a:masterClrMapping/>
   </p:clrMapOvr>
+  <p:timing>
+    <p:tnLst>
+      <p:par>
+        <p:cTn id="1" dur="indefinite" restart="never" nodeType="tmRoot"/>
+      </p:par>
+    </p:tnLst>
+  </p:timing>
 </p:sld>
 </file>
 
@@ -13436,13 +13609,20 @@
     </p:spTree>
     <p:extLst>
       <p:ext uri="{BB962C8B-B14F-4D97-AF65-F5344CB8AC3E}">
-        <p14:creationId xmlns:p14="http://schemas.microsoft.com/office/powerpoint/2010/main" val="1976057169"/>
+        <p14:creationId xmlns:p14="http://schemas.microsoft.com/office/powerpoint/2010/main" xmlns="" val="1976057169"/>
       </p:ext>
     </p:extLst>
   </p:cSld>
   <p:clrMapOvr>
     <a:masterClrMapping/>
   </p:clrMapOvr>
+  <p:timing>
+    <p:tnLst>
+      <p:par>
+        <p:cTn id="1" dur="indefinite" restart="never" nodeType="tmRoot"/>
+      </p:par>
+    </p:tnLst>
+  </p:timing>
 </p:sld>
 </file>
 
@@ -13575,7 +13755,7 @@
           <p:nvPr>
             <p:extLst>
               <p:ext uri="{D42A27DB-BD31-4B8C-83A1-F6EECF244321}">
-                <p14:modId xmlns:p14="http://schemas.microsoft.com/office/powerpoint/2010/main" val="625910118"/>
+                <p14:modId xmlns:p14="http://schemas.microsoft.com/office/powerpoint/2010/main" xmlns="" val="625910118"/>
               </p:ext>
             </p:extLst>
           </p:nvPr>
@@ -13593,13 +13773,20 @@
     </p:spTree>
     <p:extLst>
       <p:ext uri="{BB962C8B-B14F-4D97-AF65-F5344CB8AC3E}">
-        <p14:creationId xmlns:p14="http://schemas.microsoft.com/office/powerpoint/2010/main" val="179655853"/>
+        <p14:creationId xmlns:p14="http://schemas.microsoft.com/office/powerpoint/2010/main" xmlns="" val="179655853"/>
       </p:ext>
     </p:extLst>
   </p:cSld>
   <p:clrMapOvr>
     <a:masterClrMapping/>
   </p:clrMapOvr>
+  <p:timing>
+    <p:tnLst>
+      <p:par>
+        <p:cTn id="1" dur="indefinite" restart="never" nodeType="tmRoot"/>
+      </p:par>
+    </p:tnLst>
+  </p:timing>
 </p:sld>
 </file>
 
@@ -13649,7 +13836,7 @@
           <p:cNvPr id="7" name="Diagramm 6">
             <a:extLst>
               <a:ext uri="{FF2B5EF4-FFF2-40B4-BE49-F238E27FC236}">
-                <a16:creationId xmlns:a16="http://schemas.microsoft.com/office/drawing/2014/main" id="{9841F122-51C3-430E-8A7E-871D79072991}"/>
+                <a16:creationId xmlns:a16="http://schemas.microsoft.com/office/drawing/2014/main" xmlns="" id="{9841F122-51C3-430E-8A7E-871D79072991}"/>
               </a:ext>
             </a:extLst>
           </p:cNvPr>
@@ -13657,7 +13844,7 @@
           <p:nvPr>
             <p:extLst>
               <p:ext uri="{D42A27DB-BD31-4B8C-83A1-F6EECF244321}">
-                <p14:modId xmlns:p14="http://schemas.microsoft.com/office/powerpoint/2010/main" val="694219115"/>
+                <p14:modId xmlns:p14="http://schemas.microsoft.com/office/powerpoint/2010/main" xmlns="" val="694219115"/>
               </p:ext>
             </p:extLst>
           </p:nvPr>
@@ -13677,7 +13864,7 @@
           <p:cNvPr id="8" name="Diagramm 7">
             <a:extLst>
               <a:ext uri="{FF2B5EF4-FFF2-40B4-BE49-F238E27FC236}">
-                <a16:creationId xmlns:a16="http://schemas.microsoft.com/office/drawing/2014/main" id="{9841F122-51C3-430E-8A7E-871D79072991}"/>
+                <a16:creationId xmlns:a16="http://schemas.microsoft.com/office/drawing/2014/main" xmlns="" id="{9841F122-51C3-430E-8A7E-871D79072991}"/>
               </a:ext>
             </a:extLst>
           </p:cNvPr>
@@ -13685,7 +13872,7 @@
           <p:nvPr>
             <p:extLst>
               <p:ext uri="{D42A27DB-BD31-4B8C-83A1-F6EECF244321}">
-                <p14:modId xmlns:p14="http://schemas.microsoft.com/office/powerpoint/2010/main" val="29132963"/>
+                <p14:modId xmlns:p14="http://schemas.microsoft.com/office/powerpoint/2010/main" xmlns="" val="29132963"/>
               </p:ext>
             </p:extLst>
           </p:nvPr>
@@ -13703,13 +13890,20 @@
     </p:spTree>
     <p:extLst>
       <p:ext uri="{BB962C8B-B14F-4D97-AF65-F5344CB8AC3E}">
-        <p14:creationId xmlns:p14="http://schemas.microsoft.com/office/powerpoint/2010/main" val="1350698107"/>
+        <p14:creationId xmlns:p14="http://schemas.microsoft.com/office/powerpoint/2010/main" xmlns="" val="1350698107"/>
       </p:ext>
     </p:extLst>
   </p:cSld>
   <p:clrMapOvr>
     <a:masterClrMapping/>
   </p:clrMapOvr>
+  <p:timing>
+    <p:tnLst>
+      <p:par>
+        <p:cTn id="1" dur="indefinite" restart="never" nodeType="tmRoot"/>
+      </p:par>
+    </p:tnLst>
+  </p:timing>
 </p:sld>
 </file>
 
@@ -13851,13 +14045,20 @@
     </p:spTree>
     <p:extLst>
       <p:ext uri="{BB962C8B-B14F-4D97-AF65-F5344CB8AC3E}">
-        <p14:creationId xmlns:p14="http://schemas.microsoft.com/office/powerpoint/2010/main" val="666352572"/>
+        <p14:creationId xmlns:p14="http://schemas.microsoft.com/office/powerpoint/2010/main" xmlns="" val="666352572"/>
       </p:ext>
     </p:extLst>
   </p:cSld>
   <p:clrMapOvr>
     <a:masterClrMapping/>
   </p:clrMapOvr>
+  <p:timing>
+    <p:tnLst>
+      <p:par>
+        <p:cTn id="1" dur="indefinite" restart="never" nodeType="tmRoot"/>
+      </p:par>
+    </p:tnLst>
+  </p:timing>
 </p:sld>
 </file>
 
@@ -14055,28 +14256,28 @@
                 <a:gridCol w="848634">
                   <a:extLst>
                     <a:ext uri="{9D8B030D-6E8A-4147-A177-3AD203B41FA5}">
-                      <a16:colId xmlns:a16="http://schemas.microsoft.com/office/drawing/2014/main" val="20000"/>
+                      <a16:colId xmlns:a16="http://schemas.microsoft.com/office/drawing/2014/main" xmlns="" val="20000"/>
                     </a:ext>
                   </a:extLst>
                 </a:gridCol>
                 <a:gridCol w="979193">
                   <a:extLst>
                     <a:ext uri="{9D8B030D-6E8A-4147-A177-3AD203B41FA5}">
-                      <a16:colId xmlns:a16="http://schemas.microsoft.com/office/drawing/2014/main" val="20001"/>
+                      <a16:colId xmlns:a16="http://schemas.microsoft.com/office/drawing/2014/main" xmlns="" val="20001"/>
                     </a:ext>
                   </a:extLst>
                 </a:gridCol>
                 <a:gridCol w="1044473">
                   <a:extLst>
                     <a:ext uri="{9D8B030D-6E8A-4147-A177-3AD203B41FA5}">
-                      <a16:colId xmlns:a16="http://schemas.microsoft.com/office/drawing/2014/main" val="20002"/>
+                      <a16:colId xmlns:a16="http://schemas.microsoft.com/office/drawing/2014/main" xmlns="" val="20002"/>
                     </a:ext>
                   </a:extLst>
                 </a:gridCol>
                 <a:gridCol w="913914">
                   <a:extLst>
                     <a:ext uri="{9D8B030D-6E8A-4147-A177-3AD203B41FA5}">
-                      <a16:colId xmlns:a16="http://schemas.microsoft.com/office/drawing/2014/main" val="20003"/>
+                      <a16:colId xmlns:a16="http://schemas.microsoft.com/office/drawing/2014/main" xmlns="" val="20003"/>
                     </a:ext>
                   </a:extLst>
                 </a:gridCol>
@@ -14154,7 +14355,7 @@
                 </a:tc>
                 <a:extLst>
                   <a:ext uri="{0D108BD9-81ED-4DB2-BD59-A6C34878D82A}">
-                    <a16:rowId xmlns:a16="http://schemas.microsoft.com/office/drawing/2014/main" val="10000"/>
+                    <a16:rowId xmlns:a16="http://schemas.microsoft.com/office/drawing/2014/main" xmlns="" val="10000"/>
                   </a:ext>
                 </a:extLst>
               </a:tr>
@@ -14233,7 +14434,7 @@
                 </a:tc>
                 <a:extLst>
                   <a:ext uri="{0D108BD9-81ED-4DB2-BD59-A6C34878D82A}">
-                    <a16:rowId xmlns:a16="http://schemas.microsoft.com/office/drawing/2014/main" val="10001"/>
+                    <a16:rowId xmlns:a16="http://schemas.microsoft.com/office/drawing/2014/main" xmlns="" val="10001"/>
                   </a:ext>
                 </a:extLst>
               </a:tr>
@@ -14350,7 +14551,7 @@
                 </a:tc>
                 <a:extLst>
                   <a:ext uri="{0D108BD9-81ED-4DB2-BD59-A6C34878D82A}">
-                    <a16:rowId xmlns:a16="http://schemas.microsoft.com/office/drawing/2014/main" val="10002"/>
+                    <a16:rowId xmlns:a16="http://schemas.microsoft.com/office/drawing/2014/main" xmlns="" val="10002"/>
                   </a:ext>
                 </a:extLst>
               </a:tr>
@@ -14467,7 +14668,7 @@
                 </a:tc>
                 <a:extLst>
                   <a:ext uri="{0D108BD9-81ED-4DB2-BD59-A6C34878D82A}">
-                    <a16:rowId xmlns:a16="http://schemas.microsoft.com/office/drawing/2014/main" val="10003"/>
+                    <a16:rowId xmlns:a16="http://schemas.microsoft.com/office/drawing/2014/main" xmlns="" val="10003"/>
                   </a:ext>
                 </a:extLst>
               </a:tr>
@@ -14480,6 +14681,13 @@
   <p:clrMapOvr>
     <a:masterClrMapping/>
   </p:clrMapOvr>
+  <p:timing>
+    <p:tnLst>
+      <p:par>
+        <p:cTn id="1" dur="indefinite" restart="never" nodeType="tmRoot"/>
+      </p:par>
+    </p:tnLst>
+  </p:timing>
 </p:sld>
 </file>
 
@@ -14533,14 +14741,14 @@
           <p:nvPr>
             <p:extLst>
               <p:ext uri="{D42A27DB-BD31-4B8C-83A1-F6EECF244321}">
-                <p14:modId xmlns:p14="http://schemas.microsoft.com/office/powerpoint/2010/main" val="712036674"/>
+                <p14:modId xmlns:p14="http://schemas.microsoft.com/office/powerpoint/2010/main" xmlns="" val="712036674"/>
               </p:ext>
             </p:extLst>
           </p:nvPr>
         </p:nvGraphicFramePr>
         <p:xfrm>
           <a:off x="827584" y="1772816"/>
-          <a:ext cx="7344816" cy="1463040"/>
+          <a:ext cx="7316316" cy="1870500"/>
         </p:xfrm>
         <a:graphic>
           <a:graphicData uri="http://schemas.openxmlformats.org/drawingml/2006/table">
@@ -14549,29 +14757,22 @@
                 <a:tableStyleId>{616DA210-FB5B-4158-B5E0-FEB733F419BA}</a:tableStyleId>
               </a:tblPr>
               <a:tblGrid>
-                <a:gridCol w="2457776">
+                <a:gridCol w="3672359">
                   <a:extLst>
                     <a:ext uri="{9D8B030D-6E8A-4147-A177-3AD203B41FA5}">
-                      <a16:colId xmlns:a16="http://schemas.microsoft.com/office/drawing/2014/main" val="20000"/>
+                      <a16:colId xmlns:a16="http://schemas.microsoft.com/office/drawing/2014/main" xmlns="" val="20000"/>
                     </a:ext>
                   </a:extLst>
                 </a:gridCol>
-                <a:gridCol w="2438768">
+                <a:gridCol w="3643957">
                   <a:extLst>
                     <a:ext uri="{9D8B030D-6E8A-4147-A177-3AD203B41FA5}">
-                      <a16:colId xmlns:a16="http://schemas.microsoft.com/office/drawing/2014/main" val="20001"/>
-                    </a:ext>
-                  </a:extLst>
-                </a:gridCol>
-                <a:gridCol w="2448272">
-                  <a:extLst>
-                    <a:ext uri="{9D8B030D-6E8A-4147-A177-3AD203B41FA5}">
-                      <a16:colId xmlns:a16="http://schemas.microsoft.com/office/drawing/2014/main" val="20002"/>
+                      <a16:colId xmlns:a16="http://schemas.microsoft.com/office/drawing/2014/main" xmlns="" val="20001"/>
                     </a:ext>
                   </a:extLst>
                 </a:gridCol>
               </a:tblGrid>
-              <a:tr h="360040">
+              <a:tr h="467625">
                 <a:tc>
                   <a:txBody>
                     <a:bodyPr/>
@@ -14598,36 +14799,13 @@
                   </a:txBody>
                   <a:tcPr/>
                 </a:tc>
-                <a:tc>
-                  <a:txBody>
-                    <a:bodyPr/>
-                    <a:lstStyle/>
-                    <a:p>
-                      <a:r>
-                        <a:rPr lang="de-DE" dirty="0"/>
-                        <a:t>Wasserfallmodell</a:t>
-                      </a:r>
-                    </a:p>
-                  </a:txBody>
-                  <a:tcPr/>
-                </a:tc>
                 <a:extLst>
                   <a:ext uri="{0D108BD9-81ED-4DB2-BD59-A6C34878D82A}">
-                    <a16:rowId xmlns:a16="http://schemas.microsoft.com/office/drawing/2014/main" val="10000"/>
+                    <a16:rowId xmlns:a16="http://schemas.microsoft.com/office/drawing/2014/main" xmlns="" val="10000"/>
                   </a:ext>
                 </a:extLst>
               </a:tr>
-              <a:tr h="360040">
-                <a:tc>
-                  <a:txBody>
-                    <a:bodyPr/>
-                    <a:lstStyle/>
-                    <a:p>
-                      <a:endParaRPr lang="de-DE" dirty="0"/>
-                    </a:p>
-                  </a:txBody>
-                  <a:tcPr/>
-                </a:tc>
+              <a:tr h="467625">
                 <a:tc>
                   <a:txBody>
                     <a:bodyPr/>
@@ -14650,21 +14828,11 @@
                 </a:tc>
                 <a:extLst>
                   <a:ext uri="{0D108BD9-81ED-4DB2-BD59-A6C34878D82A}">
-                    <a16:rowId xmlns:a16="http://schemas.microsoft.com/office/drawing/2014/main" val="10001"/>
+                    <a16:rowId xmlns:a16="http://schemas.microsoft.com/office/drawing/2014/main" xmlns="" val="10001"/>
                   </a:ext>
                 </a:extLst>
               </a:tr>
-              <a:tr h="360040">
-                <a:tc>
-                  <a:txBody>
-                    <a:bodyPr/>
-                    <a:lstStyle/>
-                    <a:p>
-                      <a:endParaRPr lang="de-DE" dirty="0"/>
-                    </a:p>
-                  </a:txBody>
-                  <a:tcPr/>
-                </a:tc>
+              <a:tr h="467625">
                 <a:tc>
                   <a:txBody>
                     <a:bodyPr/>
@@ -14687,21 +14855,11 @@
                 </a:tc>
                 <a:extLst>
                   <a:ext uri="{0D108BD9-81ED-4DB2-BD59-A6C34878D82A}">
-                    <a16:rowId xmlns:a16="http://schemas.microsoft.com/office/drawing/2014/main" val="10002"/>
+                    <a16:rowId xmlns:a16="http://schemas.microsoft.com/office/drawing/2014/main" xmlns="" val="10002"/>
                   </a:ext>
                 </a:extLst>
               </a:tr>
-              <a:tr h="360040">
-                <a:tc>
-                  <a:txBody>
-                    <a:bodyPr/>
-                    <a:lstStyle/>
-                    <a:p>
-                      <a:endParaRPr lang="de-DE" dirty="0"/>
-                    </a:p>
-                  </a:txBody>
-                  <a:tcPr/>
-                </a:tc>
+              <a:tr h="467625">
                 <a:tc>
                   <a:txBody>
                     <a:bodyPr/>
@@ -14724,7 +14882,7 @@
                 </a:tc>
                 <a:extLst>
                   <a:ext uri="{0D108BD9-81ED-4DB2-BD59-A6C34878D82A}">
-                    <a16:rowId xmlns:a16="http://schemas.microsoft.com/office/drawing/2014/main" val="10003"/>
+                    <a16:rowId xmlns:a16="http://schemas.microsoft.com/office/drawing/2014/main" xmlns="" val="10003"/>
                   </a:ext>
                 </a:extLst>
               </a:tr>
@@ -14732,16 +14890,94 @@
           </a:graphicData>
         </a:graphic>
       </p:graphicFrame>
+      <p:sp>
+        <p:nvSpPr>
+          <p:cNvPr id="5" name="Inhaltsplatzhalter 2"/>
+          <p:cNvSpPr>
+            <a:spLocks noGrp="1"/>
+          </p:cNvSpPr>
+          <p:nvPr>
+            <p:ph sz="quarter" idx="1"/>
+          </p:nvPr>
+        </p:nvSpPr>
+        <p:spPr>
+          <a:xfrm>
+            <a:off x="857224" y="3857628"/>
+            <a:ext cx="7467600" cy="2357454"/>
+          </a:xfrm>
+        </p:spPr>
+        <p:txBody>
+          <a:bodyPr>
+            <a:normAutofit lnSpcReduction="10000"/>
+          </a:bodyPr>
+          <a:lstStyle/>
+          <a:p>
+            <a:pPr>
+              <a:lnSpc>
+                <a:spcPct val="150000"/>
+              </a:lnSpc>
+            </a:pPr>
+            <a:r>
+              <a:rPr lang="de-DE" dirty="0" smtClean="0">
+                <a:latin typeface="Calibri" pitchFamily="34" charset="0"/>
+                <a:cs typeface="Calibri" pitchFamily="34" charset="0"/>
+              </a:rPr>
+              <a:t>Änderungen weiterleiten und dokumentieren schwierig/aufwendig</a:t>
+            </a:r>
+          </a:p>
+          <a:p>
+            <a:pPr>
+              <a:lnSpc>
+                <a:spcPct val="150000"/>
+              </a:lnSpc>
+            </a:pPr>
+            <a:r>
+              <a:rPr lang="de-DE" dirty="0" smtClean="0">
+                <a:latin typeface="Calibri" pitchFamily="34" charset="0"/>
+                <a:cs typeface="Calibri" pitchFamily="34" charset="0"/>
+              </a:rPr>
+              <a:t>Struktur einfach zu verstehen</a:t>
+            </a:r>
+          </a:p>
+          <a:p>
+            <a:pPr>
+              <a:lnSpc>
+                <a:spcPct val="150000"/>
+              </a:lnSpc>
+            </a:pPr>
+            <a:r>
+              <a:rPr lang="de-DE" dirty="0" smtClean="0">
+                <a:latin typeface="Calibri" pitchFamily="34" charset="0"/>
+                <a:cs typeface="Calibri" pitchFamily="34" charset="0"/>
+              </a:rPr>
+              <a:t>Gute Lernerfahrung</a:t>
+            </a:r>
+          </a:p>
+          <a:p>
+            <a:endParaRPr lang="de-DE" sz="3200" dirty="0">
+              <a:latin typeface="Calibri" pitchFamily="34" charset="0"/>
+              <a:cs typeface="Calibri" pitchFamily="34" charset="0"/>
+            </a:endParaRPr>
+          </a:p>
+        </p:txBody>
+      </p:sp>
     </p:spTree>
     <p:extLst>
       <p:ext uri="{BB962C8B-B14F-4D97-AF65-F5344CB8AC3E}">
-        <p14:creationId xmlns:p14="http://schemas.microsoft.com/office/powerpoint/2010/main" val="1751430848"/>
+        <p14:creationId xmlns:p14="http://schemas.microsoft.com/office/powerpoint/2010/main" xmlns="" val="1751430848"/>
       </p:ext>
     </p:extLst>
   </p:cSld>
   <p:clrMapOvr>
     <a:masterClrMapping/>
   </p:clrMapOvr>
+  <p:timing>
+    <p:tnLst>
+      <p:par>
+        <p:cTn id="1" dur="indefinite" restart="never" nodeType="tmRoot"/>
+      </p:par>
+    </p:tnLst>
+  </p:timing>
 </p:sld>
 </file>
 
@@ -14801,7 +15037,7 @@
             <a:hlinkClick r:id="" action="ppaction://media"/>
             <a:extLst>
               <a:ext uri="{FF2B5EF4-FFF2-40B4-BE49-F238E27FC236}">
-                <a16:creationId xmlns:a16="http://schemas.microsoft.com/office/drawing/2014/main" id="{2C42DB09-1A9D-4045-ACA4-1E5B54C0D122}"/>
+                <a16:creationId xmlns:a16="http://schemas.microsoft.com/office/drawing/2014/main" xmlns="" id="{2C42DB09-1A9D-4045-ACA4-1E5B54C0D122}"/>
               </a:ext>
             </a:extLst>
           </p:cNvPr>
@@ -14810,10 +15046,10 @@
           </p:cNvPicPr>
           <p:nvPr>
             <p:ph sz="quarter" idx="1"/>
-            <a:videoFile r:link="rId2"/>
+            <a:videoFile r:link="rId1"/>
             <p:extLst>
               <p:ext uri="{DAA4B4D4-6D71-4841-9C94-3DE7FCFB9230}">
-                <p14:media xmlns:p14="http://schemas.microsoft.com/office/powerpoint/2010/main" r:embed="rId1"/>
+                <p14:media xmlns:p14="http://schemas.microsoft.com/office/powerpoint/2010/main" xmlns="" r:embed="rId3"/>
               </p:ext>
             </p:extLst>
           </p:nvPr>
@@ -14834,7 +15070,7 @@
     </p:spTree>
     <p:extLst>
       <p:ext uri="{BB962C8B-B14F-4D97-AF65-F5344CB8AC3E}">
-        <p14:creationId xmlns:p14="http://schemas.microsoft.com/office/powerpoint/2010/main" val="190360359"/>
+        <p14:creationId xmlns:p14="http://schemas.microsoft.com/office/powerpoint/2010/main" xmlns="" val="190360359"/>
       </p:ext>
     </p:extLst>
   </p:cSld>
@@ -15141,6 +15377,13 @@
   <p:clrMapOvr>
     <a:masterClrMapping/>
   </p:clrMapOvr>
+  <p:timing>
+    <p:tnLst>
+      <p:par>
+        <p:cTn id="1" dur="indefinite" restart="never" nodeType="tmRoot"/>
+      </p:par>
+    </p:tnLst>
+  </p:timing>
 </p:sld>
 </file>
 
@@ -15284,7 +15527,7 @@
           <p:cNvPr id="5" name="Textfeld 4">
             <a:extLst>
               <a:ext uri="{FF2B5EF4-FFF2-40B4-BE49-F238E27FC236}">
-                <a16:creationId xmlns:a16="http://schemas.microsoft.com/office/drawing/2014/main" id="{09786EE4-3498-40F3-9F90-CDFBC09CBAF7}"/>
+                <a16:creationId xmlns:a16="http://schemas.microsoft.com/office/drawing/2014/main" xmlns="" id="{09786EE4-3498-40F3-9F90-CDFBC09CBAF7}"/>
               </a:ext>
             </a:extLst>
           </p:cNvPr>
@@ -15319,7 +15562,7 @@
           <p:cNvPr id="6" name="Textfeld 5">
             <a:extLst>
               <a:ext uri="{FF2B5EF4-FFF2-40B4-BE49-F238E27FC236}">
-                <a16:creationId xmlns:a16="http://schemas.microsoft.com/office/drawing/2014/main" id="{69886C5E-71FD-41B2-868A-548B5A8ABE95}"/>
+                <a16:creationId xmlns:a16="http://schemas.microsoft.com/office/drawing/2014/main" xmlns="" id="{69886C5E-71FD-41B2-868A-548B5A8ABE95}"/>
               </a:ext>
             </a:extLst>
           </p:cNvPr>
@@ -15362,7 +15605,7 @@
           <p:cNvPr id="8" name="Gerader Verbinder 7">
             <a:extLst>
               <a:ext uri="{FF2B5EF4-FFF2-40B4-BE49-F238E27FC236}">
-                <a16:creationId xmlns:a16="http://schemas.microsoft.com/office/drawing/2014/main" id="{472F3D41-D8FA-45DF-9E64-84B95CF2462D}"/>
+                <a16:creationId xmlns:a16="http://schemas.microsoft.com/office/drawing/2014/main" xmlns="" id="{472F3D41-D8FA-45DF-9E64-84B95CF2462D}"/>
               </a:ext>
             </a:extLst>
           </p:cNvPr>
@@ -15401,7 +15644,7 @@
           <p:cNvPr id="9" name="Gerader Verbinder 8">
             <a:extLst>
               <a:ext uri="{FF2B5EF4-FFF2-40B4-BE49-F238E27FC236}">
-                <a16:creationId xmlns:a16="http://schemas.microsoft.com/office/drawing/2014/main" id="{9D2AC886-E6AD-4582-807A-531D6E17B093}"/>
+                <a16:creationId xmlns:a16="http://schemas.microsoft.com/office/drawing/2014/main" xmlns="" id="{9D2AC886-E6AD-4582-807A-531D6E17B093}"/>
               </a:ext>
             </a:extLst>
           </p:cNvPr>
@@ -15440,7 +15683,7 @@
           <p:cNvPr id="14" name="Pfeil: nach rechts 13">
             <a:extLst>
               <a:ext uri="{FF2B5EF4-FFF2-40B4-BE49-F238E27FC236}">
-                <a16:creationId xmlns:a16="http://schemas.microsoft.com/office/drawing/2014/main" id="{62849E79-E495-42E3-A5C7-0396A5C82072}"/>
+                <a16:creationId xmlns:a16="http://schemas.microsoft.com/office/drawing/2014/main" xmlns="" id="{62849E79-E495-42E3-A5C7-0396A5C82072}"/>
               </a:ext>
             </a:extLst>
           </p:cNvPr>
@@ -15486,7 +15729,7 @@
           <p:cNvPr id="15" name="Grafik 14" descr="fridge_face.png">
             <a:extLst>
               <a:ext uri="{FF2B5EF4-FFF2-40B4-BE49-F238E27FC236}">
-                <a16:creationId xmlns:a16="http://schemas.microsoft.com/office/drawing/2014/main" id="{0E33A284-8A7D-4AD9-A5FB-C64E6211E25C}"/>
+                <a16:creationId xmlns:a16="http://schemas.microsoft.com/office/drawing/2014/main" xmlns="" id="{0E33A284-8A7D-4AD9-A5FB-C64E6211E25C}"/>
               </a:ext>
             </a:extLst>
           </p:cNvPr>
@@ -15516,6 +15759,13 @@
   <p:clrMapOvr>
     <a:masterClrMapping/>
   </p:clrMapOvr>
+  <p:timing>
+    <p:tnLst>
+      <p:par>
+        <p:cTn id="1" dur="indefinite" restart="never" nodeType="tmRoot"/>
+      </p:par>
+    </p:tnLst>
+  </p:timing>
 </p:sld>
 </file>
 
@@ -15541,7 +15791,7 @@
           <p:cNvPr id="2" name="Titel 1">
             <a:extLst>
               <a:ext uri="{FF2B5EF4-FFF2-40B4-BE49-F238E27FC236}">
-                <a16:creationId xmlns:a16="http://schemas.microsoft.com/office/drawing/2014/main" id="{CD77C097-2ECF-4C94-BCC1-60258CCE61E3}"/>
+                <a16:creationId xmlns:a16="http://schemas.microsoft.com/office/drawing/2014/main" xmlns="" id="{CD77C097-2ECF-4C94-BCC1-60258CCE61E3}"/>
               </a:ext>
             </a:extLst>
           </p:cNvPr>
@@ -15569,7 +15819,7 @@
           <p:cNvPr id="5" name="Inhaltsplatzhalter 4" descr="Frau">
             <a:extLst>
               <a:ext uri="{FF2B5EF4-FFF2-40B4-BE49-F238E27FC236}">
-                <a16:creationId xmlns:a16="http://schemas.microsoft.com/office/drawing/2014/main" id="{E1480F7E-4E61-42AA-A583-671D4AD83567}"/>
+                <a16:creationId xmlns:a16="http://schemas.microsoft.com/office/drawing/2014/main" xmlns="" id="{E1480F7E-4E61-42AA-A583-671D4AD83567}"/>
               </a:ext>
             </a:extLst>
           </p:cNvPr>
@@ -15584,10 +15834,10 @@
           <a:blip r:embed="rId2">
             <a:extLst>
               <a:ext uri="{28A0092B-C50C-407E-A947-70E740481C1C}">
-                <a14:useLocalDpi xmlns:a14="http://schemas.microsoft.com/office/drawing/2010/main" val="0"/>
+                <a14:useLocalDpi xmlns:a14="http://schemas.microsoft.com/office/drawing/2010/main" xmlns="" val="0"/>
               </a:ext>
               <a:ext uri="{96DAC541-7B7A-43D3-8B79-37D633B846F1}">
-                <asvg:svgBlip xmlns:asvg="http://schemas.microsoft.com/office/drawing/2016/SVG/main" r:embed="rId3"/>
+                <asvg:svgBlip xmlns:asvg="http://schemas.microsoft.com/office/drawing/2016/SVG/main" xmlns="" r:embed="rId3"/>
               </a:ext>
             </a:extLst>
           </a:blip>
@@ -15607,7 +15857,7 @@
           <p:cNvPr id="6" name="Inhaltsplatzhalter 4" descr="Frau">
             <a:extLst>
               <a:ext uri="{FF2B5EF4-FFF2-40B4-BE49-F238E27FC236}">
-                <a16:creationId xmlns:a16="http://schemas.microsoft.com/office/drawing/2014/main" id="{F4B1B595-02C2-4BEF-B40E-119A2ECBAEA1}"/>
+                <a16:creationId xmlns:a16="http://schemas.microsoft.com/office/drawing/2014/main" xmlns="" id="{F4B1B595-02C2-4BEF-B40E-119A2ECBAEA1}"/>
               </a:ext>
             </a:extLst>
           </p:cNvPr>
@@ -15620,10 +15870,10 @@
           <a:blip r:embed="rId2">
             <a:extLst>
               <a:ext uri="{28A0092B-C50C-407E-A947-70E740481C1C}">
-                <a14:useLocalDpi xmlns:a14="http://schemas.microsoft.com/office/drawing/2010/main" val="0"/>
+                <a14:useLocalDpi xmlns:a14="http://schemas.microsoft.com/office/drawing/2010/main" xmlns="" val="0"/>
               </a:ext>
               <a:ext uri="{96DAC541-7B7A-43D3-8B79-37D633B846F1}">
-                <asvg:svgBlip xmlns:asvg="http://schemas.microsoft.com/office/drawing/2016/SVG/main" r:embed="rId3"/>
+                <asvg:svgBlip xmlns:asvg="http://schemas.microsoft.com/office/drawing/2016/SVG/main" xmlns="" r:embed="rId3"/>
               </a:ext>
             </a:extLst>
           </a:blip>
@@ -15646,7 +15896,7 @@
           <p:cNvPr id="7" name="Inhaltsplatzhalter 4" descr="Frau">
             <a:extLst>
               <a:ext uri="{FF2B5EF4-FFF2-40B4-BE49-F238E27FC236}">
-                <a16:creationId xmlns:a16="http://schemas.microsoft.com/office/drawing/2014/main" id="{B12B2201-BB6D-4DF6-83B0-D425295E7DE6}"/>
+                <a16:creationId xmlns:a16="http://schemas.microsoft.com/office/drawing/2014/main" xmlns="" id="{B12B2201-BB6D-4DF6-83B0-D425295E7DE6}"/>
               </a:ext>
             </a:extLst>
           </p:cNvPr>
@@ -15659,10 +15909,10 @@
           <a:blip r:embed="rId2">
             <a:extLst>
               <a:ext uri="{28A0092B-C50C-407E-A947-70E740481C1C}">
-                <a14:useLocalDpi xmlns:a14="http://schemas.microsoft.com/office/drawing/2010/main" val="0"/>
+                <a14:useLocalDpi xmlns:a14="http://schemas.microsoft.com/office/drawing/2010/main" xmlns="" val="0"/>
               </a:ext>
               <a:ext uri="{96DAC541-7B7A-43D3-8B79-37D633B846F1}">
-                <asvg:svgBlip xmlns:asvg="http://schemas.microsoft.com/office/drawing/2016/SVG/main" r:embed="rId3"/>
+                <asvg:svgBlip xmlns:asvg="http://schemas.microsoft.com/office/drawing/2016/SVG/main" xmlns="" r:embed="rId3"/>
               </a:ext>
             </a:extLst>
           </a:blip>
@@ -15685,7 +15935,7 @@
           <p:cNvPr id="8" name="Inhaltsplatzhalter 4" descr="Frau">
             <a:extLst>
               <a:ext uri="{FF2B5EF4-FFF2-40B4-BE49-F238E27FC236}">
-                <a16:creationId xmlns:a16="http://schemas.microsoft.com/office/drawing/2014/main" id="{DCF4BD2B-4606-4FF1-80F1-DB034364173E}"/>
+                <a16:creationId xmlns:a16="http://schemas.microsoft.com/office/drawing/2014/main" xmlns="" id="{DCF4BD2B-4606-4FF1-80F1-DB034364173E}"/>
               </a:ext>
             </a:extLst>
           </p:cNvPr>
@@ -15698,10 +15948,10 @@
           <a:blip r:embed="rId2">
             <a:extLst>
               <a:ext uri="{28A0092B-C50C-407E-A947-70E740481C1C}">
-                <a14:useLocalDpi xmlns:a14="http://schemas.microsoft.com/office/drawing/2010/main" val="0"/>
+                <a14:useLocalDpi xmlns:a14="http://schemas.microsoft.com/office/drawing/2010/main" xmlns="" val="0"/>
               </a:ext>
               <a:ext uri="{96DAC541-7B7A-43D3-8B79-37D633B846F1}">
-                <asvg:svgBlip xmlns:asvg="http://schemas.microsoft.com/office/drawing/2016/SVG/main" r:embed="rId3"/>
+                <asvg:svgBlip xmlns:asvg="http://schemas.microsoft.com/office/drawing/2016/SVG/main" xmlns="" r:embed="rId3"/>
               </a:ext>
             </a:extLst>
           </a:blip>
@@ -15724,7 +15974,7 @@
           <p:cNvPr id="9" name="Inhaltsplatzhalter 4" descr="Frau">
             <a:extLst>
               <a:ext uri="{FF2B5EF4-FFF2-40B4-BE49-F238E27FC236}">
-                <a16:creationId xmlns:a16="http://schemas.microsoft.com/office/drawing/2014/main" id="{078F6CCE-90EB-49ED-A06A-68863FFE816C}"/>
+                <a16:creationId xmlns:a16="http://schemas.microsoft.com/office/drawing/2014/main" xmlns="" id="{078F6CCE-90EB-49ED-A06A-68863FFE816C}"/>
               </a:ext>
             </a:extLst>
           </p:cNvPr>
@@ -15737,10 +15987,10 @@
           <a:blip r:embed="rId2">
             <a:extLst>
               <a:ext uri="{28A0092B-C50C-407E-A947-70E740481C1C}">
-                <a14:useLocalDpi xmlns:a14="http://schemas.microsoft.com/office/drawing/2010/main" val="0"/>
+                <a14:useLocalDpi xmlns:a14="http://schemas.microsoft.com/office/drawing/2010/main" xmlns="" val="0"/>
               </a:ext>
               <a:ext uri="{96DAC541-7B7A-43D3-8B79-37D633B846F1}">
-                <asvg:svgBlip xmlns:asvg="http://schemas.microsoft.com/office/drawing/2016/SVG/main" r:embed="rId3"/>
+                <asvg:svgBlip xmlns:asvg="http://schemas.microsoft.com/office/drawing/2016/SVG/main" xmlns="" r:embed="rId3"/>
               </a:ext>
             </a:extLst>
           </a:blip>
@@ -15763,7 +16013,7 @@
           <p:cNvPr id="10" name="Denkblase: wolkenförmig 9">
             <a:extLst>
               <a:ext uri="{FF2B5EF4-FFF2-40B4-BE49-F238E27FC236}">
-                <a16:creationId xmlns:a16="http://schemas.microsoft.com/office/drawing/2014/main" id="{6BA39F53-1530-4645-A9E2-F56920657475}"/>
+                <a16:creationId xmlns:a16="http://schemas.microsoft.com/office/drawing/2014/main" xmlns="" id="{6BA39F53-1530-4645-A9E2-F56920657475}"/>
               </a:ext>
             </a:extLst>
           </p:cNvPr>
@@ -15820,7 +16070,7 @@
           <p:cNvPr id="11" name="Textfeld 10">
             <a:extLst>
               <a:ext uri="{FF2B5EF4-FFF2-40B4-BE49-F238E27FC236}">
-                <a16:creationId xmlns:a16="http://schemas.microsoft.com/office/drawing/2014/main" id="{770AEFF5-07F2-45EC-B1D4-6BC0F00A736E}"/>
+                <a16:creationId xmlns:a16="http://schemas.microsoft.com/office/drawing/2014/main" xmlns="" id="{770AEFF5-07F2-45EC-B1D4-6BC0F00A736E}"/>
               </a:ext>
             </a:extLst>
           </p:cNvPr>
@@ -15873,7 +16123,7 @@
           <p:cNvPr id="12" name="Denkblase: wolkenförmig 11">
             <a:extLst>
               <a:ext uri="{FF2B5EF4-FFF2-40B4-BE49-F238E27FC236}">
-                <a16:creationId xmlns:a16="http://schemas.microsoft.com/office/drawing/2014/main" id="{600AA49D-88C9-4AC6-87E1-5182ED69E2F6}"/>
+                <a16:creationId xmlns:a16="http://schemas.microsoft.com/office/drawing/2014/main" xmlns="" id="{600AA49D-88C9-4AC6-87E1-5182ED69E2F6}"/>
               </a:ext>
             </a:extLst>
           </p:cNvPr>
@@ -15930,7 +16180,7 @@
           <p:cNvPr id="13" name="Textfeld 12">
             <a:extLst>
               <a:ext uri="{FF2B5EF4-FFF2-40B4-BE49-F238E27FC236}">
-                <a16:creationId xmlns:a16="http://schemas.microsoft.com/office/drawing/2014/main" id="{7ACCF427-47A9-4FB7-9BAB-C0A2705141AA}"/>
+                <a16:creationId xmlns:a16="http://schemas.microsoft.com/office/drawing/2014/main" xmlns="" id="{7ACCF427-47A9-4FB7-9BAB-C0A2705141AA}"/>
               </a:ext>
             </a:extLst>
           </p:cNvPr>
@@ -15977,7 +16227,7 @@
           <p:cNvPr id="15" name="Grafik 14" descr="Daumen hoch">
             <a:extLst>
               <a:ext uri="{FF2B5EF4-FFF2-40B4-BE49-F238E27FC236}">
-                <a16:creationId xmlns:a16="http://schemas.microsoft.com/office/drawing/2014/main" id="{53067388-974F-4272-A4F5-C881D1A4FACD}"/>
+                <a16:creationId xmlns:a16="http://schemas.microsoft.com/office/drawing/2014/main" xmlns="" id="{53067388-974F-4272-A4F5-C881D1A4FACD}"/>
               </a:ext>
             </a:extLst>
           </p:cNvPr>
@@ -15990,10 +16240,10 @@
           <a:blip r:embed="rId4" cstate="print">
             <a:extLst>
               <a:ext uri="{28A0092B-C50C-407E-A947-70E740481C1C}">
-                <a14:useLocalDpi xmlns:a14="http://schemas.microsoft.com/office/drawing/2010/main" val="0"/>
+                <a14:useLocalDpi xmlns:a14="http://schemas.microsoft.com/office/drawing/2010/main" xmlns="" val="0"/>
               </a:ext>
               <a:ext uri="{96DAC541-7B7A-43D3-8B79-37D633B846F1}">
-                <asvg:svgBlip xmlns:asvg="http://schemas.microsoft.com/office/drawing/2016/SVG/main" r:embed="rId5"/>
+                <asvg:svgBlip xmlns:asvg="http://schemas.microsoft.com/office/drawing/2016/SVG/main" xmlns="" r:embed="rId5"/>
               </a:ext>
             </a:extLst>
           </a:blip>
@@ -16016,7 +16266,7 @@
           <p:cNvPr id="16" name="Grafik 15" descr="Daumen hoch">
             <a:extLst>
               <a:ext uri="{FF2B5EF4-FFF2-40B4-BE49-F238E27FC236}">
-                <a16:creationId xmlns:a16="http://schemas.microsoft.com/office/drawing/2014/main" id="{3D8E31B4-B058-42ED-8143-375E74C2A008}"/>
+                <a16:creationId xmlns:a16="http://schemas.microsoft.com/office/drawing/2014/main" xmlns="" id="{3D8E31B4-B058-42ED-8143-375E74C2A008}"/>
               </a:ext>
             </a:extLst>
           </p:cNvPr>
@@ -16029,10 +16279,10 @@
           <a:blip r:embed="rId6" cstate="print">
             <a:extLst>
               <a:ext uri="{28A0092B-C50C-407E-A947-70E740481C1C}">
-                <a14:useLocalDpi xmlns:a14="http://schemas.microsoft.com/office/drawing/2010/main" val="0"/>
+                <a14:useLocalDpi xmlns:a14="http://schemas.microsoft.com/office/drawing/2010/main" xmlns="" val="0"/>
               </a:ext>
               <a:ext uri="{96DAC541-7B7A-43D3-8B79-37D633B846F1}">
-                <asvg:svgBlip xmlns:asvg="http://schemas.microsoft.com/office/drawing/2016/SVG/main" r:embed="rId7"/>
+                <asvg:svgBlip xmlns:asvg="http://schemas.microsoft.com/office/drawing/2016/SVG/main" xmlns="" r:embed="rId7"/>
               </a:ext>
             </a:extLst>
           </a:blip>
@@ -16053,13 +16303,20 @@
     </p:spTree>
     <p:extLst>
       <p:ext uri="{BB962C8B-B14F-4D97-AF65-F5344CB8AC3E}">
-        <p14:creationId xmlns:p14="http://schemas.microsoft.com/office/powerpoint/2010/main" val="3738269158"/>
+        <p14:creationId xmlns:p14="http://schemas.microsoft.com/office/powerpoint/2010/main" xmlns="" val="3738269158"/>
       </p:ext>
     </p:extLst>
   </p:cSld>
   <p:clrMapOvr>
     <a:masterClrMapping/>
   </p:clrMapOvr>
+  <p:timing>
+    <p:tnLst>
+      <p:par>
+        <p:cTn id="1" dur="indefinite" restart="never" nodeType="tmRoot"/>
+      </p:par>
+    </p:tnLst>
+  </p:timing>
 </p:sld>
 </file>
 
@@ -16205,7 +16462,7 @@
           <p:cNvPr id="5" name="Grafik 4">
             <a:extLst>
               <a:ext uri="{FF2B5EF4-FFF2-40B4-BE49-F238E27FC236}">
-                <a16:creationId xmlns:a16="http://schemas.microsoft.com/office/drawing/2014/main" id="{6AC2D600-D934-48FC-ADAE-171A5F5F813E}"/>
+                <a16:creationId xmlns:a16="http://schemas.microsoft.com/office/drawing/2014/main" xmlns="" id="{6AC2D600-D934-48FC-ADAE-171A5F5F813E}"/>
               </a:ext>
             </a:extLst>
           </p:cNvPr>
@@ -16218,7 +16475,7 @@
           <a:blip r:embed="rId2">
             <a:extLst>
               <a:ext uri="{28A0092B-C50C-407E-A947-70E740481C1C}">
-                <a14:useLocalDpi xmlns:a14="http://schemas.microsoft.com/office/drawing/2010/main" val="0"/>
+                <a14:useLocalDpi xmlns:a14="http://schemas.microsoft.com/office/drawing/2010/main" xmlns="" val="0"/>
               </a:ext>
             </a:extLst>
           </a:blip>
@@ -16239,13 +16496,20 @@
     </p:spTree>
     <p:extLst>
       <p:ext uri="{BB962C8B-B14F-4D97-AF65-F5344CB8AC3E}">
-        <p14:creationId xmlns:p14="http://schemas.microsoft.com/office/powerpoint/2010/main" val="246517011"/>
+        <p14:creationId xmlns:p14="http://schemas.microsoft.com/office/powerpoint/2010/main" xmlns="" val="246517011"/>
       </p:ext>
     </p:extLst>
   </p:cSld>
   <p:clrMapOvr>
     <a:masterClrMapping/>
   </p:clrMapOvr>
+  <p:timing>
+    <p:tnLst>
+      <p:par>
+        <p:cTn id="1" dur="indefinite" restart="never" nodeType="tmRoot"/>
+      </p:par>
+    </p:tnLst>
+  </p:timing>
 </p:sld>
 </file>
 
@@ -17274,13 +17538,20 @@
     </p:spTree>
     <p:extLst>
       <p:ext uri="{BB962C8B-B14F-4D97-AF65-F5344CB8AC3E}">
-        <p14:creationId xmlns:p14="http://schemas.microsoft.com/office/powerpoint/2010/main" val="1754742320"/>
+        <p14:creationId xmlns:p14="http://schemas.microsoft.com/office/powerpoint/2010/main" xmlns="" val="1754742320"/>
       </p:ext>
     </p:extLst>
   </p:cSld>
   <p:clrMapOvr>
     <a:masterClrMapping/>
   </p:clrMapOvr>
+  <p:timing>
+    <p:tnLst>
+      <p:par>
+        <p:cTn id="1" dur="indefinite" restart="never" nodeType="tmRoot"/>
+      </p:par>
+    </p:tnLst>
+  </p:timing>
 </p:sld>
 </file>
 
@@ -17513,7 +17784,7 @@
     </p:spTree>
     <p:extLst>
       <p:ext uri="{BB962C8B-B14F-4D97-AF65-F5344CB8AC3E}">
-        <p14:creationId xmlns:p14="http://schemas.microsoft.com/office/powerpoint/2010/main" val="1633567392"/>
+        <p14:creationId xmlns:p14="http://schemas.microsoft.com/office/powerpoint/2010/main" xmlns="" val="1633567392"/>
       </p:ext>
     </p:extLst>
   </p:cSld>
@@ -17870,7 +18141,7 @@
           <a:blip r:embed="rId2" cstate="print">
             <a:extLst>
               <a:ext uri="{28A0092B-C50C-407E-A947-70E740481C1C}">
-                <a14:useLocalDpi xmlns:a14="http://schemas.microsoft.com/office/drawing/2010/main" val="0"/>
+                <a14:useLocalDpi xmlns:a14="http://schemas.microsoft.com/office/drawing/2010/main" xmlns="" val="0"/>
               </a:ext>
             </a:extLst>
           </a:blip>
@@ -17977,6 +18248,13 @@
   <p:clrMapOvr>
     <a:masterClrMapping/>
   </p:clrMapOvr>
+  <p:timing>
+    <p:tnLst>
+      <p:par>
+        <p:cTn id="1" dur="indefinite" restart="never" nodeType="tmRoot"/>
+      </p:par>
+    </p:tnLst>
+  </p:timing>
 </p:sld>
 </file>
 
@@ -18147,13 +18425,20 @@
     </p:spTree>
     <p:extLst>
       <p:ext uri="{BB962C8B-B14F-4D97-AF65-F5344CB8AC3E}">
-        <p14:creationId xmlns:p14="http://schemas.microsoft.com/office/powerpoint/2010/main" val="1753996425"/>
+        <p14:creationId xmlns:p14="http://schemas.microsoft.com/office/powerpoint/2010/main" xmlns="" val="1753996425"/>
       </p:ext>
     </p:extLst>
   </p:cSld>
   <p:clrMapOvr>
     <a:masterClrMapping/>
   </p:clrMapOvr>
+  <p:timing>
+    <p:tnLst>
+      <p:par>
+        <p:cTn id="1" dur="indefinite" restart="never" nodeType="tmRoot"/>
+      </p:par>
+    </p:tnLst>
+  </p:timing>
 </p:sld>
 </file>
 
@@ -18493,7 +18778,7 @@
     </a:clrScheme>
     <a:fontScheme name="Office">
       <a:majorFont>
-        <a:latin typeface="Calibri Light" panose="020F0302020204030204"/>
+        <a:latin typeface="Calibri Light"/>
         <a:ea typeface=""/>
         <a:cs typeface=""/>
         <a:font script="Jpan" typeface="游ゴシック Light"/>
@@ -18545,7 +18830,7 @@
         <a:font script="Tfng" typeface="Ebrima"/>
       </a:majorFont>
       <a:minorFont>
-        <a:latin typeface="Calibri" panose="020F0502020204030204"/>
+        <a:latin typeface="Calibri"/>
         <a:ea typeface=""/>
         <a:cs typeface=""/>
         <a:font script="Jpan" typeface="游ゴシック"/>
@@ -18739,7 +19024,7 @@
   <a:extraClrSchemeLst/>
   <a:extLst>
     <a:ext uri="{05A4C25C-085E-4340-85A3-A5531E510DB2}">
-      <thm15:themeFamily xmlns:thm15="http://schemas.microsoft.com/office/thememl/2012/main" name="Office Theme" id="{62F939B6-93AF-4DB8-9C6B-D6C7DFDC589F}" vid="{4A3C46E8-61CC-4603-A589-7422A47A8E4A}"/>
+      <thm15:themeFamily xmlns:thm15="http://schemas.microsoft.com/office/thememl/2012/main" xmlns="" name="Office Theme" id="{62F939B6-93AF-4DB8-9C6B-D6C7DFDC589F}" vid="{4A3C46E8-61CC-4603-A589-7422A47A8E4A}"/>
     </a:ext>
   </a:extLst>
 </a:theme>

</xml_diff>